<commit_message>
Updated histograms & added cumulative frequency plots
</commit_message>
<xml_diff>
--- a/documents/Weight-Distributions_Six-Networks_BK2017213.pptx
+++ b/documents/Weight-Distributions_Six-Networks_BK2017213.pptx
@@ -6,12 +6,13 @@
   </p:sldMasterIdLst>
   <p:sldIdLst>
     <p:sldId id="256" r:id="rId2"/>
-    <p:sldId id="257" r:id="rId3"/>
-    <p:sldId id="258" r:id="rId4"/>
-    <p:sldId id="259" r:id="rId5"/>
-    <p:sldId id="260" r:id="rId6"/>
-    <p:sldId id="261" r:id="rId7"/>
-    <p:sldId id="262" r:id="rId8"/>
+    <p:sldId id="263" r:id="rId3"/>
+    <p:sldId id="257" r:id="rId4"/>
+    <p:sldId id="258" r:id="rId5"/>
+    <p:sldId id="259" r:id="rId6"/>
+    <p:sldId id="260" r:id="rId7"/>
+    <p:sldId id="261" r:id="rId8"/>
+    <p:sldId id="262" r:id="rId9"/>
   </p:sldIdLst>
   <p:sldSz cx="9144000" cy="6858000" type="screen4x3"/>
   <p:notesSz cx="6858000" cy="9144000"/>
@@ -294,7 +295,7 @@
           <a:p>
             <a:fld id="{89CDD5A9-FC10-4100-AEE1-A60528CB9091}" type="datetimeFigureOut">
               <a:rPr lang="en-US" smtClean="0"/>
-              <a:t>2/13/2017</a:t>
+              <a:t>2/20/2017</a:t>
             </a:fld>
             <a:endParaRPr lang="en-US"/>
           </a:p>
@@ -464,7 +465,7 @@
           <a:p>
             <a:fld id="{89CDD5A9-FC10-4100-AEE1-A60528CB9091}" type="datetimeFigureOut">
               <a:rPr lang="en-US" smtClean="0"/>
-              <a:t>2/13/2017</a:t>
+              <a:t>2/20/2017</a:t>
             </a:fld>
             <a:endParaRPr lang="en-US"/>
           </a:p>
@@ -644,7 +645,7 @@
           <a:p>
             <a:fld id="{89CDD5A9-FC10-4100-AEE1-A60528CB9091}" type="datetimeFigureOut">
               <a:rPr lang="en-US" smtClean="0"/>
-              <a:t>2/13/2017</a:t>
+              <a:t>2/20/2017</a:t>
             </a:fld>
             <a:endParaRPr lang="en-US"/>
           </a:p>
@@ -814,7 +815,7 @@
           <a:p>
             <a:fld id="{89CDD5A9-FC10-4100-AEE1-A60528CB9091}" type="datetimeFigureOut">
               <a:rPr lang="en-US" smtClean="0"/>
-              <a:t>2/13/2017</a:t>
+              <a:t>2/20/2017</a:t>
             </a:fld>
             <a:endParaRPr lang="en-US"/>
           </a:p>
@@ -1060,7 +1061,7 @@
           <a:p>
             <a:fld id="{89CDD5A9-FC10-4100-AEE1-A60528CB9091}" type="datetimeFigureOut">
               <a:rPr lang="en-US" smtClean="0"/>
-              <a:t>2/13/2017</a:t>
+              <a:t>2/20/2017</a:t>
             </a:fld>
             <a:endParaRPr lang="en-US"/>
           </a:p>
@@ -1348,7 +1349,7 @@
           <a:p>
             <a:fld id="{89CDD5A9-FC10-4100-AEE1-A60528CB9091}" type="datetimeFigureOut">
               <a:rPr lang="en-US" smtClean="0"/>
-              <a:t>2/13/2017</a:t>
+              <a:t>2/20/2017</a:t>
             </a:fld>
             <a:endParaRPr lang="en-US"/>
           </a:p>
@@ -1770,7 +1771,7 @@
           <a:p>
             <a:fld id="{89CDD5A9-FC10-4100-AEE1-A60528CB9091}" type="datetimeFigureOut">
               <a:rPr lang="en-US" smtClean="0"/>
-              <a:t>2/13/2017</a:t>
+              <a:t>2/20/2017</a:t>
             </a:fld>
             <a:endParaRPr lang="en-US"/>
           </a:p>
@@ -1888,7 +1889,7 @@
           <a:p>
             <a:fld id="{89CDD5A9-FC10-4100-AEE1-A60528CB9091}" type="datetimeFigureOut">
               <a:rPr lang="en-US" smtClean="0"/>
-              <a:t>2/13/2017</a:t>
+              <a:t>2/20/2017</a:t>
             </a:fld>
             <a:endParaRPr lang="en-US"/>
           </a:p>
@@ -1983,7 +1984,7 @@
           <a:p>
             <a:fld id="{89CDD5A9-FC10-4100-AEE1-A60528CB9091}" type="datetimeFigureOut">
               <a:rPr lang="en-US" smtClean="0"/>
-              <a:t>2/13/2017</a:t>
+              <a:t>2/20/2017</a:t>
             </a:fld>
             <a:endParaRPr lang="en-US"/>
           </a:p>
@@ -2260,7 +2261,7 @@
           <a:p>
             <a:fld id="{89CDD5A9-FC10-4100-AEE1-A60528CB9091}" type="datetimeFigureOut">
               <a:rPr lang="en-US" smtClean="0"/>
-              <a:t>2/13/2017</a:t>
+              <a:t>2/20/2017</a:t>
             </a:fld>
             <a:endParaRPr lang="en-US"/>
           </a:p>
@@ -2513,7 +2514,7 @@
           <a:p>
             <a:fld id="{89CDD5A9-FC10-4100-AEE1-A60528CB9091}" type="datetimeFigureOut">
               <a:rPr lang="en-US" smtClean="0"/>
-              <a:t>2/13/2017</a:t>
+              <a:t>2/20/2017</a:t>
             </a:fld>
             <a:endParaRPr lang="en-US"/>
           </a:p>
@@ -2726,7 +2727,7 @@
           <a:p>
             <a:fld id="{89CDD5A9-FC10-4100-AEE1-A60528CB9091}" type="datetimeFigureOut">
               <a:rPr lang="en-US" smtClean="0"/>
-              <a:t>2/13/2017</a:t>
+              <a:t>2/20/2017</a:t>
             </a:fld>
             <a:endParaRPr lang="en-US"/>
           </a:p>
@@ -3120,7 +3121,11 @@
           <a:p>
             <a:r>
               <a:rPr lang="en-US" dirty="0" smtClean="0"/>
-              <a:t>“Insignificant” Regulatory Weights in Six Database-Derived GRNs</a:t>
+              <a:t>Distribution of Regulatory </a:t>
+            </a:r>
+            <a:r>
+              <a:rPr lang="en-US" dirty="0" smtClean="0"/>
+              <a:t>Weights in Six Database-Derived GRNs</a:t>
             </a:r>
             <a:endParaRPr lang="en-US" dirty="0"/>
           </a:p>
@@ -3149,7 +3154,11 @@
           <a:p>
             <a:r>
               <a:rPr lang="en-US" dirty="0" smtClean="0"/>
-              <a:t>Last Updated: 02/13/17</a:t>
+              <a:t>Last Updated: </a:t>
+            </a:r>
+            <a:r>
+              <a:rPr lang="en-US" dirty="0" smtClean="0"/>
+              <a:t>02/20/17</a:t>
             </a:r>
             <a:endParaRPr lang="en-US" dirty="0"/>
           </a:p>
@@ -3165,6 +3174,13 @@
   <p:clrMapOvr>
     <a:masterClrMapping/>
   </p:clrMapOvr>
+  <p:timing>
+    <p:tnLst>
+      <p:par>
+        <p:cTn id="1" dur="indefinite" restart="never" nodeType="tmRoot"/>
+      </p:par>
+    </p:tnLst>
+  </p:timing>
 </p:sld>
 </file>
 
@@ -3195,6 +3211,127 @@
             <p:ph type="title"/>
           </p:nvPr>
         </p:nvSpPr>
+        <p:spPr/>
+        <p:txBody>
+          <a:bodyPr/>
+          <a:lstStyle/>
+          <a:p>
+            <a:r>
+              <a:rPr lang="en-US" dirty="0" smtClean="0"/>
+              <a:t>Updates</a:t>
+            </a:r>
+            <a:endParaRPr lang="en-US" dirty="0"/>
+          </a:p>
+        </p:txBody>
+      </p:sp>
+      <p:sp>
+        <p:nvSpPr>
+          <p:cNvPr id="3" name="Content Placeholder 2"/>
+          <p:cNvSpPr>
+            <a:spLocks noGrp="1"/>
+          </p:cNvSpPr>
+          <p:nvPr>
+            <p:ph idx="1"/>
+          </p:nvPr>
+        </p:nvSpPr>
+        <p:spPr/>
+        <p:txBody>
+          <a:bodyPr/>
+          <a:lstStyle/>
+          <a:p>
+            <a:r>
+              <a:rPr lang="en-US" dirty="0" smtClean="0"/>
+              <a:t>Network names adjusted to db1-db6.</a:t>
+            </a:r>
+          </a:p>
+          <a:p>
+            <a:r>
+              <a:rPr lang="en-US" dirty="0" smtClean="0"/>
+              <a:t>Normalized weight values were scaled *100.</a:t>
+            </a:r>
+          </a:p>
+          <a:p>
+            <a:r>
+              <a:rPr lang="en-US" dirty="0" smtClean="0"/>
+              <a:t>Maximum values written as +/- 99.99.</a:t>
+            </a:r>
+          </a:p>
+          <a:p>
+            <a:r>
+              <a:rPr lang="en-US" dirty="0"/>
+              <a:t>Fixed bin interval=10</a:t>
+            </a:r>
+            <a:r>
+              <a:rPr lang="en-US" dirty="0" smtClean="0"/>
+              <a:t>.</a:t>
+            </a:r>
+          </a:p>
+          <a:p>
+            <a:r>
+              <a:rPr lang="en-US" dirty="0" smtClean="0"/>
+              <a:t>Color coding only for activation &amp; repression.</a:t>
+            </a:r>
+          </a:p>
+          <a:p>
+            <a:r>
+              <a:rPr lang="en-US" smtClean="0"/>
+              <a:t>Cumulative frequency graphs </a:t>
+            </a:r>
+            <a:r>
+              <a:rPr lang="en-US" dirty="0" smtClean="0"/>
+              <a:t>generated.</a:t>
+            </a:r>
+            <a:endParaRPr lang="en-US" dirty="0"/>
+          </a:p>
+        </p:txBody>
+      </p:sp>
+    </p:spTree>
+    <p:extLst>
+      <p:ext uri="{BB962C8B-B14F-4D97-AF65-F5344CB8AC3E}">
+        <p14:creationId xmlns:p14="http://schemas.microsoft.com/office/powerpoint/2010/main" val="2865687055"/>
+      </p:ext>
+    </p:extLst>
+  </p:cSld>
+  <p:clrMapOvr>
+    <a:masterClrMapping/>
+  </p:clrMapOvr>
+  <p:timing>
+    <p:tnLst>
+      <p:par>
+        <p:cTn id="1" dur="indefinite" restart="never" nodeType="tmRoot"/>
+      </p:par>
+    </p:tnLst>
+  </p:timing>
+</p:sld>
+</file>
+
+<file path=ppt/slides/slide3.xml><?xml version="1.0" encoding="utf-8"?>
+<p:sld xmlns:a="http://schemas.openxmlformats.org/drawingml/2006/main" xmlns:r="http://schemas.openxmlformats.org/officeDocument/2006/relationships" xmlns:p="http://schemas.openxmlformats.org/presentationml/2006/main">
+  <p:cSld>
+    <p:spTree>
+      <p:nvGrpSpPr>
+        <p:cNvPr id="1" name=""/>
+        <p:cNvGrpSpPr/>
+        <p:nvPr/>
+      </p:nvGrpSpPr>
+      <p:grpSpPr>
+        <a:xfrm>
+          <a:off x="0" y="0"/>
+          <a:ext cx="0" cy="0"/>
+          <a:chOff x="0" y="0"/>
+          <a:chExt cx="0" cy="0"/>
+        </a:xfrm>
+      </p:grpSpPr>
+      <p:sp>
+        <p:nvSpPr>
+          <p:cNvPr id="2" name="Title 1"/>
+          <p:cNvSpPr>
+            <a:spLocks noGrp="1"/>
+          </p:cNvSpPr>
+          <p:nvPr>
+            <p:ph type="title"/>
+          </p:nvPr>
+        </p:nvSpPr>
         <p:spPr>
           <a:xfrm>
             <a:off x="0" y="0"/>
@@ -3209,7 +3346,15 @@
           <a:p>
             <a:r>
               <a:rPr lang="en-US" sz="2400" b="1" dirty="0" smtClean="0"/>
-              <a:t>Distribution of Wild-Type Derived Network Regulatory Weights</a:t>
+              <a:t>Distribution of </a:t>
+            </a:r>
+            <a:r>
+              <a:rPr lang="en-US" sz="2400" b="1" dirty="0" smtClean="0"/>
+              <a:t>db1 Regulatory </a:t>
+            </a:r>
+            <a:r>
+              <a:rPr lang="en-US" sz="2400" b="1" dirty="0" smtClean="0"/>
+              <a:t>Weights</a:t>
             </a:r>
             <a:br>
               <a:rPr lang="en-US" sz="2400" b="1" dirty="0" smtClean="0"/>
@@ -3224,7 +3369,7 @@
       </p:sp>
       <p:pic>
         <p:nvPicPr>
-          <p:cNvPr id="1028" name="Picture 4"/>
+          <p:cNvPr id="1026" name="Picture 2"/>
           <p:cNvPicPr>
             <a:picLocks noChangeAspect="1" noChangeArrowheads="1"/>
           </p:cNvPicPr>
@@ -3245,8 +3390,62 @@
         </p:blipFill>
         <p:spPr bwMode="auto">
           <a:xfrm>
-            <a:off x="381000" y="990600"/>
-            <a:ext cx="8379022" cy="5867400"/>
+            <a:off x="-76200" y="1244459"/>
+            <a:ext cx="5562600" cy="4603891"/>
+          </a:xfrm>
+          <a:prstGeom prst="rect">
+            <a:avLst/>
+          </a:prstGeom>
+          <a:noFill/>
+          <a:ln>
+            <a:noFill/>
+          </a:ln>
+          <a:extLst>
+            <a:ext uri="{909E8E84-426E-40DD-AFC4-6F175D3DCCD1}">
+              <a14:hiddenFill xmlns:a14="http://schemas.microsoft.com/office/drawing/2010/main">
+                <a:solidFill>
+                  <a:schemeClr val="accent1"/>
+                </a:solidFill>
+              </a14:hiddenFill>
+            </a:ext>
+            <a:ext uri="{91240B29-F687-4F45-9708-019B960494DF}">
+              <a14:hiddenLine xmlns:a14="http://schemas.microsoft.com/office/drawing/2010/main" w="9525">
+                <a:solidFill>
+                  <a:schemeClr val="tx1"/>
+                </a:solidFill>
+                <a:miter lim="800000"/>
+                <a:headEnd/>
+                <a:tailEnd/>
+              </a14:hiddenLine>
+            </a:ext>
+          </a:extLst>
+        </p:spPr>
+      </p:pic>
+      <p:pic>
+        <p:nvPicPr>
+          <p:cNvPr id="3" name="Picture 4"/>
+          <p:cNvPicPr>
+            <a:picLocks noChangeAspect="1" noChangeArrowheads="1"/>
+          </p:cNvPicPr>
+          <p:nvPr/>
+        </p:nvPicPr>
+        <p:blipFill>
+          <a:blip r:embed="rId3">
+            <a:extLst>
+              <a:ext uri="{28A0092B-C50C-407E-A947-70E740481C1C}">
+                <a14:useLocalDpi xmlns:a14="http://schemas.microsoft.com/office/drawing/2010/main" val="0"/>
+              </a:ext>
+            </a:extLst>
+          </a:blip>
+          <a:srcRect/>
+          <a:stretch>
+            <a:fillRect/>
+          </a:stretch>
+        </p:blipFill>
+        <p:spPr bwMode="auto">
+          <a:xfrm>
+            <a:off x="4343400" y="1313020"/>
+            <a:ext cx="4953000" cy="4478180"/>
           </a:xfrm>
           <a:prstGeom prst="rect">
             <a:avLst/>
@@ -3286,10 +3485,17 @@
   <p:clrMapOvr>
     <a:masterClrMapping/>
   </p:clrMapOvr>
+  <p:timing>
+    <p:tnLst>
+      <p:par>
+        <p:cTn id="1" dur="indefinite" restart="never" nodeType="tmRoot"/>
+      </p:par>
+    </p:tnLst>
+  </p:timing>
 </p:sld>
 </file>
 
-<file path=ppt/slides/slide3.xml><?xml version="1.0" encoding="utf-8"?>
+<file path=ppt/slides/slide4.xml><?xml version="1.0" encoding="utf-8"?>
 <p:sld xmlns:a="http://schemas.openxmlformats.org/drawingml/2006/main" xmlns:r="http://schemas.openxmlformats.org/officeDocument/2006/relationships" xmlns:p="http://schemas.openxmlformats.org/presentationml/2006/main">
   <p:cSld>
     <p:spTree>
@@ -3330,7 +3536,19 @@
           <a:p>
             <a:r>
               <a:rPr lang="en-US" sz="2400" b="1" dirty="0" smtClean="0"/>
-              <a:t>Distribution of ∆cin5 Derived Network Regulatory Weights</a:t>
+              <a:t>Distribution of </a:t>
+            </a:r>
+            <a:r>
+              <a:rPr lang="en-US" sz="2400" b="1" dirty="0" smtClean="0"/>
+              <a:t>db2 </a:t>
+            </a:r>
+            <a:r>
+              <a:rPr lang="en-US" sz="2400" b="1" dirty="0" smtClean="0"/>
+              <a:t>Regulatory </a:t>
+            </a:r>
+            <a:r>
+              <a:rPr lang="en-US" sz="2400" b="1" dirty="0" smtClean="0"/>
+              <a:t>Weights</a:t>
             </a:r>
             <a:br>
               <a:rPr lang="en-US" sz="2400" b="1" dirty="0" smtClean="0"/>
@@ -3345,7 +3563,7 @@
       </p:sp>
       <p:pic>
         <p:nvPicPr>
-          <p:cNvPr id="2052" name="Picture 4"/>
+          <p:cNvPr id="2050" name="Picture 2"/>
           <p:cNvPicPr>
             <a:picLocks noChangeAspect="1" noChangeArrowheads="1"/>
           </p:cNvPicPr>
@@ -3366,8 +3584,62 @@
         </p:blipFill>
         <p:spPr bwMode="auto">
           <a:xfrm>
-            <a:off x="1028700" y="939423"/>
-            <a:ext cx="6972300" cy="5918577"/>
+            <a:off x="-152400" y="1071562"/>
+            <a:ext cx="5359547" cy="4829175"/>
+          </a:xfrm>
+          <a:prstGeom prst="rect">
+            <a:avLst/>
+          </a:prstGeom>
+          <a:noFill/>
+          <a:ln>
+            <a:noFill/>
+          </a:ln>
+          <a:extLst>
+            <a:ext uri="{909E8E84-426E-40DD-AFC4-6F175D3DCCD1}">
+              <a14:hiddenFill xmlns:a14="http://schemas.microsoft.com/office/drawing/2010/main">
+                <a:solidFill>
+                  <a:schemeClr val="accent1"/>
+                </a:solidFill>
+              </a14:hiddenFill>
+            </a:ext>
+            <a:ext uri="{91240B29-F687-4F45-9708-019B960494DF}">
+              <a14:hiddenLine xmlns:a14="http://schemas.microsoft.com/office/drawing/2010/main" w="9525">
+                <a:solidFill>
+                  <a:schemeClr val="tx1"/>
+                </a:solidFill>
+                <a:miter lim="800000"/>
+                <a:headEnd/>
+                <a:tailEnd/>
+              </a14:hiddenLine>
+            </a:ext>
+          </a:extLst>
+        </p:spPr>
+      </p:pic>
+      <p:pic>
+        <p:nvPicPr>
+          <p:cNvPr id="2051" name="Picture 3"/>
+          <p:cNvPicPr>
+            <a:picLocks noChangeAspect="1" noChangeArrowheads="1"/>
+          </p:cNvPicPr>
+          <p:nvPr/>
+        </p:nvPicPr>
+        <p:blipFill>
+          <a:blip r:embed="rId3">
+            <a:extLst>
+              <a:ext uri="{28A0092B-C50C-407E-A947-70E740481C1C}">
+                <a14:useLocalDpi xmlns:a14="http://schemas.microsoft.com/office/drawing/2010/main" val="0"/>
+              </a:ext>
+            </a:extLst>
+          </a:blip>
+          <a:srcRect/>
+          <a:stretch>
+            <a:fillRect/>
+          </a:stretch>
+        </p:blipFill>
+        <p:spPr bwMode="auto">
+          <a:xfrm>
+            <a:off x="4038600" y="1143000"/>
+            <a:ext cx="5251938" cy="4754880"/>
           </a:xfrm>
           <a:prstGeom prst="rect">
             <a:avLst/>
@@ -3407,10 +3679,17 @@
   <p:clrMapOvr>
     <a:masterClrMapping/>
   </p:clrMapOvr>
+  <p:timing>
+    <p:tnLst>
+      <p:par>
+        <p:cTn id="1" dur="indefinite" restart="never" nodeType="tmRoot"/>
+      </p:par>
+    </p:tnLst>
+  </p:timing>
 </p:sld>
 </file>
 
-<file path=ppt/slides/slide4.xml><?xml version="1.0" encoding="utf-8"?>
+<file path=ppt/slides/slide5.xml><?xml version="1.0" encoding="utf-8"?>
 <p:sld xmlns:a="http://schemas.openxmlformats.org/drawingml/2006/main" xmlns:r="http://schemas.openxmlformats.org/officeDocument/2006/relationships" xmlns:p="http://schemas.openxmlformats.org/presentationml/2006/main">
   <p:cSld>
     <p:spTree>
@@ -3450,8 +3729,20 @@
           <a:lstStyle/>
           <a:p>
             <a:r>
+              <a:rPr lang="en-US" sz="2400" b="1" dirty="0" smtClean="0"/>
+              <a:t>Distribution of </a:t>
+            </a:r>
+            <a:r>
+              <a:rPr lang="en-US" sz="2400" b="1" dirty="0" smtClean="0"/>
+              <a:t>db3 Regulatory </a:t>
+            </a:r>
+            <a:r>
+              <a:rPr lang="en-US" sz="2400" b="1" dirty="0" smtClean="0"/>
+              <a:t>Weights</a:t>
+            </a:r>
+            <a:r>
               <a:rPr lang="en-US" sz="2400" dirty="0" smtClean="0"/>
-              <a:t>Distribution of ∆cin5 Derived Network Regulatory Weights</a:t>
+              <a:t/>
             </a:r>
             <a:br>
               <a:rPr lang="en-US" sz="2400" dirty="0" smtClean="0"/>
@@ -3466,7 +3757,7 @@
       </p:sp>
       <p:pic>
         <p:nvPicPr>
-          <p:cNvPr id="3076" name="Picture 4"/>
+          <p:cNvPr id="3074" name="Picture 2"/>
           <p:cNvPicPr>
             <a:picLocks noChangeAspect="1" noChangeArrowheads="1"/>
           </p:cNvPicPr>
@@ -3487,8 +3778,62 @@
         </p:blipFill>
         <p:spPr bwMode="auto">
           <a:xfrm>
-            <a:off x="990600" y="920143"/>
-            <a:ext cx="7162800" cy="5937857"/>
+            <a:off x="-125194" y="1280160"/>
+            <a:ext cx="5382994" cy="4663440"/>
+          </a:xfrm>
+          <a:prstGeom prst="rect">
+            <a:avLst/>
+          </a:prstGeom>
+          <a:noFill/>
+          <a:ln>
+            <a:noFill/>
+          </a:ln>
+          <a:extLst>
+            <a:ext uri="{909E8E84-426E-40DD-AFC4-6F175D3DCCD1}">
+              <a14:hiddenFill xmlns:a14="http://schemas.microsoft.com/office/drawing/2010/main">
+                <a:solidFill>
+                  <a:schemeClr val="accent1"/>
+                </a:solidFill>
+              </a14:hiddenFill>
+            </a:ext>
+            <a:ext uri="{91240B29-F687-4F45-9708-019B960494DF}">
+              <a14:hiddenLine xmlns:a14="http://schemas.microsoft.com/office/drawing/2010/main" w="9525">
+                <a:solidFill>
+                  <a:schemeClr val="tx1"/>
+                </a:solidFill>
+                <a:miter lim="800000"/>
+                <a:headEnd/>
+                <a:tailEnd/>
+              </a14:hiddenLine>
+            </a:ext>
+          </a:extLst>
+        </p:spPr>
+      </p:pic>
+      <p:pic>
+        <p:nvPicPr>
+          <p:cNvPr id="3075" name="Picture 3"/>
+          <p:cNvPicPr>
+            <a:picLocks noChangeAspect="1" noChangeArrowheads="1"/>
+          </p:cNvPicPr>
+          <p:nvPr/>
+        </p:nvPicPr>
+        <p:blipFill>
+          <a:blip r:embed="rId3">
+            <a:extLst>
+              <a:ext uri="{28A0092B-C50C-407E-A947-70E740481C1C}">
+                <a14:useLocalDpi xmlns:a14="http://schemas.microsoft.com/office/drawing/2010/main" val="0"/>
+              </a:ext>
+            </a:extLst>
+          </a:blip>
+          <a:srcRect/>
+          <a:stretch>
+            <a:fillRect/>
+          </a:stretch>
+        </p:blipFill>
+        <p:spPr bwMode="auto">
+          <a:xfrm>
+            <a:off x="4114800" y="1341459"/>
+            <a:ext cx="5334000" cy="4630716"/>
           </a:xfrm>
           <a:prstGeom prst="rect">
             <a:avLst/>
@@ -3528,10 +3873,17 @@
   <p:clrMapOvr>
     <a:masterClrMapping/>
   </p:clrMapOvr>
+  <p:timing>
+    <p:tnLst>
+      <p:par>
+        <p:cTn id="1" dur="indefinite" restart="never" nodeType="tmRoot"/>
+      </p:par>
+    </p:tnLst>
+  </p:timing>
 </p:sld>
 </file>
 
-<file path=ppt/slides/slide5.xml><?xml version="1.0" encoding="utf-8"?>
+<file path=ppt/slides/slide6.xml><?xml version="1.0" encoding="utf-8"?>
 <p:sld xmlns:a="http://schemas.openxmlformats.org/drawingml/2006/main" xmlns:r="http://schemas.openxmlformats.org/officeDocument/2006/relationships" xmlns:p="http://schemas.openxmlformats.org/presentationml/2006/main">
   <p:cSld>
     <p:spTree>
@@ -3572,7 +3924,15 @@
           <a:p>
             <a:r>
               <a:rPr lang="en-US" sz="2400" b="1" dirty="0" smtClean="0"/>
-              <a:t>Distribution of ∆gln3 Derived Network Regulatory Weights</a:t>
+              <a:t>Distribution of </a:t>
+            </a:r>
+            <a:r>
+              <a:rPr lang="en-US" sz="2400" b="1" dirty="0" smtClean="0"/>
+              <a:t>db4 Regulatory </a:t>
+            </a:r>
+            <a:r>
+              <a:rPr lang="en-US" sz="2400" b="1" dirty="0" smtClean="0"/>
+              <a:t>Weights</a:t>
             </a:r>
             <a:br>
               <a:rPr lang="en-US" sz="2400" b="1" dirty="0" smtClean="0"/>
@@ -3587,7 +3947,7 @@
       </p:sp>
       <p:pic>
         <p:nvPicPr>
-          <p:cNvPr id="4100" name="Picture 4"/>
+          <p:cNvPr id="4098" name="Picture 2"/>
           <p:cNvPicPr>
             <a:picLocks noChangeAspect="1" noChangeArrowheads="1"/>
           </p:cNvPicPr>
@@ -3608,8 +3968,62 @@
         </p:blipFill>
         <p:spPr bwMode="auto">
           <a:xfrm>
-            <a:off x="990600" y="990600"/>
-            <a:ext cx="7010400" cy="5880010"/>
+            <a:off x="-69692" y="1345264"/>
+            <a:ext cx="5251292" cy="4607859"/>
+          </a:xfrm>
+          <a:prstGeom prst="rect">
+            <a:avLst/>
+          </a:prstGeom>
+          <a:noFill/>
+          <a:ln>
+            <a:noFill/>
+          </a:ln>
+          <a:extLst>
+            <a:ext uri="{909E8E84-426E-40DD-AFC4-6F175D3DCCD1}">
+              <a14:hiddenFill xmlns:a14="http://schemas.microsoft.com/office/drawing/2010/main">
+                <a:solidFill>
+                  <a:schemeClr val="accent1"/>
+                </a:solidFill>
+              </a14:hiddenFill>
+            </a:ext>
+            <a:ext uri="{91240B29-F687-4F45-9708-019B960494DF}">
+              <a14:hiddenLine xmlns:a14="http://schemas.microsoft.com/office/drawing/2010/main" w="9525">
+                <a:solidFill>
+                  <a:schemeClr val="tx1"/>
+                </a:solidFill>
+                <a:miter lim="800000"/>
+                <a:headEnd/>
+                <a:tailEnd/>
+              </a14:hiddenLine>
+            </a:ext>
+          </a:extLst>
+        </p:spPr>
+      </p:pic>
+      <p:pic>
+        <p:nvPicPr>
+          <p:cNvPr id="4099" name="Picture 3"/>
+          <p:cNvPicPr>
+            <a:picLocks noChangeAspect="1" noChangeArrowheads="1"/>
+          </p:cNvPicPr>
+          <p:nvPr/>
+        </p:nvPicPr>
+        <p:blipFill>
+          <a:blip r:embed="rId3">
+            <a:extLst>
+              <a:ext uri="{28A0092B-C50C-407E-A947-70E740481C1C}">
+                <a14:useLocalDpi xmlns:a14="http://schemas.microsoft.com/office/drawing/2010/main" val="0"/>
+              </a:ext>
+            </a:extLst>
+          </a:blip>
+          <a:srcRect/>
+          <a:stretch>
+            <a:fillRect/>
+          </a:stretch>
+        </p:blipFill>
+        <p:spPr bwMode="auto">
+          <a:xfrm>
+            <a:off x="4092221" y="1295400"/>
+            <a:ext cx="5127979" cy="4754880"/>
           </a:xfrm>
           <a:prstGeom prst="rect">
             <a:avLst/>
@@ -3649,10 +4063,17 @@
   <p:clrMapOvr>
     <a:masterClrMapping/>
   </p:clrMapOvr>
+  <p:timing>
+    <p:tnLst>
+      <p:par>
+        <p:cTn id="1" dur="indefinite" restart="never" nodeType="tmRoot"/>
+      </p:par>
+    </p:tnLst>
+  </p:timing>
 </p:sld>
 </file>
 
-<file path=ppt/slides/slide6.xml><?xml version="1.0" encoding="utf-8"?>
+<file path=ppt/slides/slide7.xml><?xml version="1.0" encoding="utf-8"?>
 <p:sld xmlns:a="http://schemas.openxmlformats.org/drawingml/2006/main" xmlns:r="http://schemas.openxmlformats.org/officeDocument/2006/relationships" xmlns:p="http://schemas.openxmlformats.org/presentationml/2006/main">
   <p:cSld>
     <p:spTree>
@@ -3693,7 +4114,15 @@
           <a:p>
             <a:r>
               <a:rPr lang="en-US" sz="2400" b="1" dirty="0" smtClean="0"/>
-              <a:t>Distribution of ∆hap4 Derived Network Regulatory Weights</a:t>
+              <a:t>Distribution of </a:t>
+            </a:r>
+            <a:r>
+              <a:rPr lang="en-US" sz="2400" b="1" dirty="0" smtClean="0"/>
+              <a:t>db5 Regulatory </a:t>
+            </a:r>
+            <a:r>
+              <a:rPr lang="en-US" sz="2400" b="1" dirty="0" smtClean="0"/>
+              <a:t>Weights</a:t>
             </a:r>
             <a:br>
               <a:rPr lang="en-US" sz="2400" b="1" dirty="0" smtClean="0"/>
@@ -3708,7 +4137,7 @@
       </p:sp>
       <p:pic>
         <p:nvPicPr>
-          <p:cNvPr id="5124" name="Picture 4"/>
+          <p:cNvPr id="5122" name="Picture 2"/>
           <p:cNvPicPr>
             <a:picLocks noChangeAspect="1" noChangeArrowheads="1"/>
           </p:cNvPicPr>
@@ -3729,8 +4158,62 @@
         </p:blipFill>
         <p:spPr bwMode="auto">
           <a:xfrm>
-            <a:off x="1143000" y="949929"/>
-            <a:ext cx="6781800" cy="5908071"/>
+            <a:off x="-76200" y="1274548"/>
+            <a:ext cx="5486400" cy="4735727"/>
+          </a:xfrm>
+          <a:prstGeom prst="rect">
+            <a:avLst/>
+          </a:prstGeom>
+          <a:noFill/>
+          <a:ln>
+            <a:noFill/>
+          </a:ln>
+          <a:extLst>
+            <a:ext uri="{909E8E84-426E-40DD-AFC4-6F175D3DCCD1}">
+              <a14:hiddenFill xmlns:a14="http://schemas.microsoft.com/office/drawing/2010/main">
+                <a:solidFill>
+                  <a:schemeClr val="accent1"/>
+                </a:solidFill>
+              </a14:hiddenFill>
+            </a:ext>
+            <a:ext uri="{91240B29-F687-4F45-9708-019B960494DF}">
+              <a14:hiddenLine xmlns:a14="http://schemas.microsoft.com/office/drawing/2010/main" w="9525">
+                <a:solidFill>
+                  <a:schemeClr val="tx1"/>
+                </a:solidFill>
+                <a:miter lim="800000"/>
+                <a:headEnd/>
+                <a:tailEnd/>
+              </a14:hiddenLine>
+            </a:ext>
+          </a:extLst>
+        </p:spPr>
+      </p:pic>
+      <p:pic>
+        <p:nvPicPr>
+          <p:cNvPr id="5123" name="Picture 3"/>
+          <p:cNvPicPr>
+            <a:picLocks noChangeAspect="1" noChangeArrowheads="1"/>
+          </p:cNvPicPr>
+          <p:nvPr/>
+        </p:nvPicPr>
+        <p:blipFill>
+          <a:blip r:embed="rId3">
+            <a:extLst>
+              <a:ext uri="{28A0092B-C50C-407E-A947-70E740481C1C}">
+                <a14:useLocalDpi xmlns:a14="http://schemas.microsoft.com/office/drawing/2010/main" val="0"/>
+              </a:ext>
+            </a:extLst>
+          </a:blip>
+          <a:srcRect/>
+          <a:stretch>
+            <a:fillRect/>
+          </a:stretch>
+        </p:blipFill>
+        <p:spPr bwMode="auto">
+          <a:xfrm>
+            <a:off x="4238625" y="1295400"/>
+            <a:ext cx="4981575" cy="4639398"/>
           </a:xfrm>
           <a:prstGeom prst="rect">
             <a:avLst/>
@@ -3770,10 +4253,17 @@
   <p:clrMapOvr>
     <a:masterClrMapping/>
   </p:clrMapOvr>
+  <p:timing>
+    <p:tnLst>
+      <p:par>
+        <p:cTn id="1" dur="indefinite" restart="never" nodeType="tmRoot"/>
+      </p:par>
+    </p:tnLst>
+  </p:timing>
 </p:sld>
 </file>
 
-<file path=ppt/slides/slide7.xml><?xml version="1.0" encoding="utf-8"?>
+<file path=ppt/slides/slide8.xml><?xml version="1.0" encoding="utf-8"?>
 <p:sld xmlns:a="http://schemas.openxmlformats.org/drawingml/2006/main" xmlns:r="http://schemas.openxmlformats.org/officeDocument/2006/relationships" xmlns:p="http://schemas.openxmlformats.org/presentationml/2006/main">
   <p:cSld>
     <p:spTree>
@@ -3814,7 +4304,15 @@
           <a:p>
             <a:r>
               <a:rPr lang="en-US" sz="2400" b="1" dirty="0" smtClean="0"/>
-              <a:t>Distribution of ∆zap1 Derived Network Regulatory Weights</a:t>
+              <a:t>Distribution of </a:t>
+            </a:r>
+            <a:r>
+              <a:rPr lang="en-US" sz="2400" b="1" dirty="0" smtClean="0"/>
+              <a:t>db6 Regulatory </a:t>
+            </a:r>
+            <a:r>
+              <a:rPr lang="en-US" sz="2400" b="1" dirty="0" smtClean="0"/>
+              <a:t>Weights</a:t>
             </a:r>
             <a:r>
               <a:rPr lang="en-US" sz="2400" dirty="0" smtClean="0"/>
@@ -3833,7 +4331,7 @@
       </p:sp>
       <p:pic>
         <p:nvPicPr>
-          <p:cNvPr id="6148" name="Picture 4"/>
+          <p:cNvPr id="6146" name="Picture 2"/>
           <p:cNvPicPr>
             <a:picLocks noChangeAspect="1" noChangeArrowheads="1"/>
           </p:cNvPicPr>
@@ -3854,8 +4352,62 @@
         </p:blipFill>
         <p:spPr bwMode="auto">
           <a:xfrm>
-            <a:off x="990600" y="971209"/>
-            <a:ext cx="7162800" cy="5886792"/>
+            <a:off x="-76200" y="1295400"/>
+            <a:ext cx="5408576" cy="4762500"/>
+          </a:xfrm>
+          <a:prstGeom prst="rect">
+            <a:avLst/>
+          </a:prstGeom>
+          <a:noFill/>
+          <a:ln>
+            <a:noFill/>
+          </a:ln>
+          <a:extLst>
+            <a:ext uri="{909E8E84-426E-40DD-AFC4-6F175D3DCCD1}">
+              <a14:hiddenFill xmlns:a14="http://schemas.microsoft.com/office/drawing/2010/main">
+                <a:solidFill>
+                  <a:schemeClr val="accent1"/>
+                </a:solidFill>
+              </a14:hiddenFill>
+            </a:ext>
+            <a:ext uri="{91240B29-F687-4F45-9708-019B960494DF}">
+              <a14:hiddenLine xmlns:a14="http://schemas.microsoft.com/office/drawing/2010/main" w="9525">
+                <a:solidFill>
+                  <a:schemeClr val="tx1"/>
+                </a:solidFill>
+                <a:miter lim="800000"/>
+                <a:headEnd/>
+                <a:tailEnd/>
+              </a14:hiddenLine>
+            </a:ext>
+          </a:extLst>
+        </p:spPr>
+      </p:pic>
+      <p:pic>
+        <p:nvPicPr>
+          <p:cNvPr id="6147" name="Picture 3"/>
+          <p:cNvPicPr>
+            <a:picLocks noChangeAspect="1" noChangeArrowheads="1"/>
+          </p:cNvPicPr>
+          <p:nvPr/>
+        </p:nvPicPr>
+        <p:blipFill>
+          <a:blip r:embed="rId3">
+            <a:extLst>
+              <a:ext uri="{28A0092B-C50C-407E-A947-70E740481C1C}">
+                <a14:useLocalDpi xmlns:a14="http://schemas.microsoft.com/office/drawing/2010/main" val="0"/>
+              </a:ext>
+            </a:extLst>
+          </a:blip>
+          <a:srcRect/>
+          <a:stretch>
+            <a:fillRect/>
+          </a:stretch>
+        </p:blipFill>
+        <p:spPr bwMode="auto">
+          <a:xfrm>
+            <a:off x="4191000" y="1416934"/>
+            <a:ext cx="5105400" cy="4679066"/>
           </a:xfrm>
           <a:prstGeom prst="rect">
             <a:avLst/>
@@ -3895,6 +4447,13 @@
   <p:clrMapOvr>
     <a:masterClrMapping/>
   </p:clrMapOvr>
+  <p:timing>
+    <p:tnLst>
+      <p:par>
+        <p:cTn id="1" dur="indefinite" restart="never" nodeType="tmRoot"/>
+      </p:par>
+    </p:tnLst>
+  </p:timing>
 </p:sld>
 </file>
 

</xml_diff>

<commit_message>
Updated Histograms and Cumulative Plots
</commit_message>
<xml_diff>
--- a/documents/Weight-Distributions_Six-Networks_BK2017213.pptx
+++ b/documents/Weight-Distributions_Six-Networks_BK2017213.pptx
@@ -8,11 +8,17 @@
     <p:sldId id="256" r:id="rId2"/>
     <p:sldId id="263" r:id="rId3"/>
     <p:sldId id="257" r:id="rId4"/>
-    <p:sldId id="258" r:id="rId5"/>
-    <p:sldId id="259" r:id="rId6"/>
-    <p:sldId id="260" r:id="rId7"/>
-    <p:sldId id="261" r:id="rId8"/>
-    <p:sldId id="262" r:id="rId9"/>
+    <p:sldId id="264" r:id="rId5"/>
+    <p:sldId id="258" r:id="rId6"/>
+    <p:sldId id="265" r:id="rId7"/>
+    <p:sldId id="259" r:id="rId8"/>
+    <p:sldId id="266" r:id="rId9"/>
+    <p:sldId id="260" r:id="rId10"/>
+    <p:sldId id="267" r:id="rId11"/>
+    <p:sldId id="261" r:id="rId12"/>
+    <p:sldId id="268" r:id="rId13"/>
+    <p:sldId id="262" r:id="rId14"/>
+    <p:sldId id="269" r:id="rId15"/>
   </p:sldIdLst>
   <p:sldSz cx="9144000" cy="6858000" type="screen4x3"/>
   <p:notesSz cx="6858000" cy="9144000"/>
@@ -295,7 +301,7 @@
           <a:p>
             <a:fld id="{89CDD5A9-FC10-4100-AEE1-A60528CB9091}" type="datetimeFigureOut">
               <a:rPr lang="en-US" smtClean="0"/>
-              <a:t>2/20/2017</a:t>
+              <a:t>2/27/2017</a:t>
             </a:fld>
             <a:endParaRPr lang="en-US"/>
           </a:p>
@@ -465,7 +471,7 @@
           <a:p>
             <a:fld id="{89CDD5A9-FC10-4100-AEE1-A60528CB9091}" type="datetimeFigureOut">
               <a:rPr lang="en-US" smtClean="0"/>
-              <a:t>2/20/2017</a:t>
+              <a:t>2/27/2017</a:t>
             </a:fld>
             <a:endParaRPr lang="en-US"/>
           </a:p>
@@ -645,7 +651,7 @@
           <a:p>
             <a:fld id="{89CDD5A9-FC10-4100-AEE1-A60528CB9091}" type="datetimeFigureOut">
               <a:rPr lang="en-US" smtClean="0"/>
-              <a:t>2/20/2017</a:t>
+              <a:t>2/27/2017</a:t>
             </a:fld>
             <a:endParaRPr lang="en-US"/>
           </a:p>
@@ -815,7 +821,7 @@
           <a:p>
             <a:fld id="{89CDD5A9-FC10-4100-AEE1-A60528CB9091}" type="datetimeFigureOut">
               <a:rPr lang="en-US" smtClean="0"/>
-              <a:t>2/20/2017</a:t>
+              <a:t>2/27/2017</a:t>
             </a:fld>
             <a:endParaRPr lang="en-US"/>
           </a:p>
@@ -1061,7 +1067,7 @@
           <a:p>
             <a:fld id="{89CDD5A9-FC10-4100-AEE1-A60528CB9091}" type="datetimeFigureOut">
               <a:rPr lang="en-US" smtClean="0"/>
-              <a:t>2/20/2017</a:t>
+              <a:t>2/27/2017</a:t>
             </a:fld>
             <a:endParaRPr lang="en-US"/>
           </a:p>
@@ -1349,7 +1355,7 @@
           <a:p>
             <a:fld id="{89CDD5A9-FC10-4100-AEE1-A60528CB9091}" type="datetimeFigureOut">
               <a:rPr lang="en-US" smtClean="0"/>
-              <a:t>2/20/2017</a:t>
+              <a:t>2/27/2017</a:t>
             </a:fld>
             <a:endParaRPr lang="en-US"/>
           </a:p>
@@ -1771,7 +1777,7 @@
           <a:p>
             <a:fld id="{89CDD5A9-FC10-4100-AEE1-A60528CB9091}" type="datetimeFigureOut">
               <a:rPr lang="en-US" smtClean="0"/>
-              <a:t>2/20/2017</a:t>
+              <a:t>2/27/2017</a:t>
             </a:fld>
             <a:endParaRPr lang="en-US"/>
           </a:p>
@@ -1889,7 +1895,7 @@
           <a:p>
             <a:fld id="{89CDD5A9-FC10-4100-AEE1-A60528CB9091}" type="datetimeFigureOut">
               <a:rPr lang="en-US" smtClean="0"/>
-              <a:t>2/20/2017</a:t>
+              <a:t>2/27/2017</a:t>
             </a:fld>
             <a:endParaRPr lang="en-US"/>
           </a:p>
@@ -1984,7 +1990,7 @@
           <a:p>
             <a:fld id="{89CDD5A9-FC10-4100-AEE1-A60528CB9091}" type="datetimeFigureOut">
               <a:rPr lang="en-US" smtClean="0"/>
-              <a:t>2/20/2017</a:t>
+              <a:t>2/27/2017</a:t>
             </a:fld>
             <a:endParaRPr lang="en-US"/>
           </a:p>
@@ -2261,7 +2267,7 @@
           <a:p>
             <a:fld id="{89CDD5A9-FC10-4100-AEE1-A60528CB9091}" type="datetimeFigureOut">
               <a:rPr lang="en-US" smtClean="0"/>
-              <a:t>2/20/2017</a:t>
+              <a:t>2/27/2017</a:t>
             </a:fld>
             <a:endParaRPr lang="en-US"/>
           </a:p>
@@ -2514,7 +2520,7 @@
           <a:p>
             <a:fld id="{89CDD5A9-FC10-4100-AEE1-A60528CB9091}" type="datetimeFigureOut">
               <a:rPr lang="en-US" smtClean="0"/>
-              <a:t>2/20/2017</a:t>
+              <a:t>2/27/2017</a:t>
             </a:fld>
             <a:endParaRPr lang="en-US"/>
           </a:p>
@@ -2727,7 +2733,7 @@
           <a:p>
             <a:fld id="{89CDD5A9-FC10-4100-AEE1-A60528CB9091}" type="datetimeFigureOut">
               <a:rPr lang="en-US" smtClean="0"/>
-              <a:t>2/20/2017</a:t>
+              <a:t>2/27/2017</a:t>
             </a:fld>
             <a:endParaRPr lang="en-US"/>
           </a:p>
@@ -3121,11 +3127,7 @@
           <a:p>
             <a:r>
               <a:rPr lang="en-US" dirty="0" smtClean="0"/>
-              <a:t>Distribution of Regulatory </a:t>
-            </a:r>
-            <a:r>
-              <a:rPr lang="en-US" dirty="0" smtClean="0"/>
-              <a:t>Weights in Six Database-Derived GRNs</a:t>
+              <a:t>Distribution of Regulatory Weights in Six Database-Derived GRNs</a:t>
             </a:r>
             <a:endParaRPr lang="en-US" dirty="0"/>
           </a:p>
@@ -3158,7 +3160,7 @@
             </a:r>
             <a:r>
               <a:rPr lang="en-US" dirty="0" smtClean="0"/>
-              <a:t>02/20/17</a:t>
+              <a:t>02/27/17</a:t>
             </a:r>
             <a:endParaRPr lang="en-US" dirty="0"/>
           </a:p>
@@ -3168,6 +3170,924 @@
     <p:extLst>
       <p:ext uri="{BB962C8B-B14F-4D97-AF65-F5344CB8AC3E}">
         <p14:creationId xmlns:p14="http://schemas.microsoft.com/office/powerpoint/2010/main" val="1859690441"/>
+      </p:ext>
+    </p:extLst>
+  </p:cSld>
+  <p:clrMapOvr>
+    <a:masterClrMapping/>
+  </p:clrMapOvr>
+  <p:timing>
+    <p:tnLst>
+      <p:par>
+        <p:cTn id="1" dur="indefinite" restart="never" nodeType="tmRoot"/>
+      </p:par>
+    </p:tnLst>
+  </p:timing>
+</p:sld>
+</file>
+
+<file path=ppt/slides/slide10.xml><?xml version="1.0" encoding="utf-8"?>
+<p:sld xmlns:a="http://schemas.openxmlformats.org/drawingml/2006/main" xmlns:r="http://schemas.openxmlformats.org/officeDocument/2006/relationships" xmlns:p="http://schemas.openxmlformats.org/presentationml/2006/main">
+  <p:cSld>
+    <p:spTree>
+      <p:nvGrpSpPr>
+        <p:cNvPr id="1" name=""/>
+        <p:cNvGrpSpPr/>
+        <p:nvPr/>
+      </p:nvGrpSpPr>
+      <p:grpSpPr>
+        <a:xfrm>
+          <a:off x="0" y="0"/>
+          <a:ext cx="0" cy="0"/>
+          <a:chOff x="0" y="0"/>
+          <a:chExt cx="0" cy="0"/>
+        </a:xfrm>
+      </p:grpSpPr>
+      <p:sp>
+        <p:nvSpPr>
+          <p:cNvPr id="7" name="Title 1"/>
+          <p:cNvSpPr>
+            <a:spLocks noGrp="1"/>
+          </p:cNvSpPr>
+          <p:nvPr>
+            <p:ph type="title"/>
+          </p:nvPr>
+        </p:nvSpPr>
+        <p:spPr>
+          <a:xfrm>
+            <a:off x="0" y="0"/>
+            <a:ext cx="9144000" cy="914400"/>
+          </a:xfrm>
+        </p:spPr>
+        <p:txBody>
+          <a:bodyPr>
+            <a:noAutofit/>
+          </a:bodyPr>
+          <a:lstStyle/>
+          <a:p>
+            <a:r>
+              <a:rPr lang="en-US" sz="2400" b="1" dirty="0" smtClean="0"/>
+              <a:t>Distribution of db4 Regulatory Weights</a:t>
+            </a:r>
+            <a:br>
+              <a:rPr lang="en-US" sz="2400" b="1" dirty="0" smtClean="0"/>
+            </a:br>
+            <a:r>
+              <a:rPr lang="en-US" sz="2400" dirty="0" smtClean="0"/>
+              <a:t>Network: 14 Genes, 35 Edges</a:t>
+            </a:r>
+            <a:endParaRPr lang="en-US" sz="2400" b="1" dirty="0"/>
+          </a:p>
+        </p:txBody>
+      </p:sp>
+      <p:pic>
+        <p:nvPicPr>
+          <p:cNvPr id="2" name="Picture 2"/>
+          <p:cNvPicPr>
+            <a:picLocks noChangeAspect="1" noChangeArrowheads="1"/>
+          </p:cNvPicPr>
+          <p:nvPr/>
+        </p:nvPicPr>
+        <p:blipFill>
+          <a:blip r:embed="rId2">
+            <a:extLst>
+              <a:ext uri="{28A0092B-C50C-407E-A947-70E740481C1C}">
+                <a14:useLocalDpi xmlns:a14="http://schemas.microsoft.com/office/drawing/2010/main" val="0"/>
+              </a:ext>
+            </a:extLst>
+          </a:blip>
+          <a:srcRect/>
+          <a:stretch>
+            <a:fillRect/>
+          </a:stretch>
+        </p:blipFill>
+        <p:spPr bwMode="auto">
+          <a:xfrm>
+            <a:off x="-76200" y="1371600"/>
+            <a:ext cx="5524500" cy="4772025"/>
+          </a:xfrm>
+          <a:prstGeom prst="rect">
+            <a:avLst/>
+          </a:prstGeom>
+          <a:noFill/>
+          <a:ln>
+            <a:noFill/>
+          </a:ln>
+          <a:extLst>
+            <a:ext uri="{909E8E84-426E-40DD-AFC4-6F175D3DCCD1}">
+              <a14:hiddenFill xmlns:a14="http://schemas.microsoft.com/office/drawing/2010/main">
+                <a:solidFill>
+                  <a:schemeClr val="accent1"/>
+                </a:solidFill>
+              </a14:hiddenFill>
+            </a:ext>
+            <a:ext uri="{91240B29-F687-4F45-9708-019B960494DF}">
+              <a14:hiddenLine xmlns:a14="http://schemas.microsoft.com/office/drawing/2010/main" w="9525">
+                <a:solidFill>
+                  <a:schemeClr val="tx1"/>
+                </a:solidFill>
+                <a:miter lim="800000"/>
+                <a:headEnd/>
+                <a:tailEnd/>
+              </a14:hiddenLine>
+            </a:ext>
+          </a:extLst>
+        </p:spPr>
+      </p:pic>
+      <p:pic>
+        <p:nvPicPr>
+          <p:cNvPr id="3" name="Picture 3"/>
+          <p:cNvPicPr>
+            <a:picLocks noChangeAspect="1" noChangeArrowheads="1"/>
+          </p:cNvPicPr>
+          <p:nvPr/>
+        </p:nvPicPr>
+        <p:blipFill>
+          <a:blip r:embed="rId3">
+            <a:extLst>
+              <a:ext uri="{28A0092B-C50C-407E-A947-70E740481C1C}">
+                <a14:useLocalDpi xmlns:a14="http://schemas.microsoft.com/office/drawing/2010/main" val="0"/>
+              </a:ext>
+            </a:extLst>
+          </a:blip>
+          <a:srcRect/>
+          <a:stretch>
+            <a:fillRect/>
+          </a:stretch>
+        </p:blipFill>
+        <p:spPr bwMode="auto">
+          <a:xfrm>
+            <a:off x="4267201" y="1371600"/>
+            <a:ext cx="4876800" cy="4743450"/>
+          </a:xfrm>
+          <a:prstGeom prst="rect">
+            <a:avLst/>
+          </a:prstGeom>
+          <a:noFill/>
+          <a:ln>
+            <a:noFill/>
+          </a:ln>
+          <a:extLst>
+            <a:ext uri="{909E8E84-426E-40DD-AFC4-6F175D3DCCD1}">
+              <a14:hiddenFill xmlns:a14="http://schemas.microsoft.com/office/drawing/2010/main">
+                <a:solidFill>
+                  <a:schemeClr val="accent1"/>
+                </a:solidFill>
+              </a14:hiddenFill>
+            </a:ext>
+            <a:ext uri="{91240B29-F687-4F45-9708-019B960494DF}">
+              <a14:hiddenLine xmlns:a14="http://schemas.microsoft.com/office/drawing/2010/main" w="9525">
+                <a:solidFill>
+                  <a:schemeClr val="tx1"/>
+                </a:solidFill>
+                <a:miter lim="800000"/>
+                <a:headEnd/>
+                <a:tailEnd/>
+              </a14:hiddenLine>
+            </a:ext>
+          </a:extLst>
+        </p:spPr>
+      </p:pic>
+    </p:spTree>
+    <p:extLst>
+      <p:ext uri="{BB962C8B-B14F-4D97-AF65-F5344CB8AC3E}">
+        <p14:creationId xmlns:p14="http://schemas.microsoft.com/office/powerpoint/2010/main" val="1209600303"/>
+      </p:ext>
+    </p:extLst>
+  </p:cSld>
+  <p:clrMapOvr>
+    <a:masterClrMapping/>
+  </p:clrMapOvr>
+  <p:timing>
+    <p:tnLst>
+      <p:par>
+        <p:cTn id="1" dur="indefinite" restart="never" nodeType="tmRoot"/>
+      </p:par>
+    </p:tnLst>
+  </p:timing>
+</p:sld>
+</file>
+
+<file path=ppt/slides/slide11.xml><?xml version="1.0" encoding="utf-8"?>
+<p:sld xmlns:a="http://schemas.openxmlformats.org/drawingml/2006/main" xmlns:r="http://schemas.openxmlformats.org/officeDocument/2006/relationships" xmlns:p="http://schemas.openxmlformats.org/presentationml/2006/main">
+  <p:cSld>
+    <p:spTree>
+      <p:nvGrpSpPr>
+        <p:cNvPr id="1" name=""/>
+        <p:cNvGrpSpPr/>
+        <p:nvPr/>
+      </p:nvGrpSpPr>
+      <p:grpSpPr>
+        <a:xfrm>
+          <a:off x="0" y="0"/>
+          <a:ext cx="0" cy="0"/>
+          <a:chOff x="0" y="0"/>
+          <a:chExt cx="0" cy="0"/>
+        </a:xfrm>
+      </p:grpSpPr>
+      <p:sp>
+        <p:nvSpPr>
+          <p:cNvPr id="7" name="Title 1"/>
+          <p:cNvSpPr>
+            <a:spLocks noGrp="1"/>
+          </p:cNvSpPr>
+          <p:nvPr>
+            <p:ph type="title"/>
+          </p:nvPr>
+        </p:nvSpPr>
+        <p:spPr>
+          <a:xfrm>
+            <a:off x="0" y="0"/>
+            <a:ext cx="9144000" cy="914400"/>
+          </a:xfrm>
+        </p:spPr>
+        <p:txBody>
+          <a:bodyPr>
+            <a:noAutofit/>
+          </a:bodyPr>
+          <a:lstStyle/>
+          <a:p>
+            <a:r>
+              <a:rPr lang="en-US" sz="2400" b="1" dirty="0" smtClean="0"/>
+              <a:t>Distribution of db5 Regulatory Weights</a:t>
+            </a:r>
+            <a:br>
+              <a:rPr lang="en-US" sz="2400" b="1" dirty="0" smtClean="0"/>
+            </a:br>
+            <a:r>
+              <a:rPr lang="en-US" sz="2400" dirty="0" smtClean="0"/>
+              <a:t>Network: 15 Genes, 28 Edges</a:t>
+            </a:r>
+            <a:endParaRPr lang="en-US" sz="2400" b="1" dirty="0"/>
+          </a:p>
+        </p:txBody>
+      </p:sp>
+      <p:pic>
+        <p:nvPicPr>
+          <p:cNvPr id="5122" name="Picture 2"/>
+          <p:cNvPicPr>
+            <a:picLocks noChangeAspect="1" noChangeArrowheads="1"/>
+          </p:cNvPicPr>
+          <p:nvPr/>
+        </p:nvPicPr>
+        <p:blipFill>
+          <a:blip r:embed="rId2">
+            <a:extLst>
+              <a:ext uri="{28A0092B-C50C-407E-A947-70E740481C1C}">
+                <a14:useLocalDpi xmlns:a14="http://schemas.microsoft.com/office/drawing/2010/main" val="0"/>
+              </a:ext>
+            </a:extLst>
+          </a:blip>
+          <a:srcRect/>
+          <a:stretch>
+            <a:fillRect/>
+          </a:stretch>
+        </p:blipFill>
+        <p:spPr bwMode="auto">
+          <a:xfrm>
+            <a:off x="-76200" y="1274548"/>
+            <a:ext cx="5486400" cy="4735727"/>
+          </a:xfrm>
+          <a:prstGeom prst="rect">
+            <a:avLst/>
+          </a:prstGeom>
+          <a:noFill/>
+          <a:ln>
+            <a:noFill/>
+          </a:ln>
+          <a:extLst>
+            <a:ext uri="{909E8E84-426E-40DD-AFC4-6F175D3DCCD1}">
+              <a14:hiddenFill xmlns:a14="http://schemas.microsoft.com/office/drawing/2010/main">
+                <a:solidFill>
+                  <a:schemeClr val="accent1"/>
+                </a:solidFill>
+              </a14:hiddenFill>
+            </a:ext>
+            <a:ext uri="{91240B29-F687-4F45-9708-019B960494DF}">
+              <a14:hiddenLine xmlns:a14="http://schemas.microsoft.com/office/drawing/2010/main" w="9525">
+                <a:solidFill>
+                  <a:schemeClr val="tx1"/>
+                </a:solidFill>
+                <a:miter lim="800000"/>
+                <a:headEnd/>
+                <a:tailEnd/>
+              </a14:hiddenLine>
+            </a:ext>
+          </a:extLst>
+        </p:spPr>
+      </p:pic>
+      <p:pic>
+        <p:nvPicPr>
+          <p:cNvPr id="5123" name="Picture 3"/>
+          <p:cNvPicPr>
+            <a:picLocks noChangeAspect="1" noChangeArrowheads="1"/>
+          </p:cNvPicPr>
+          <p:nvPr/>
+        </p:nvPicPr>
+        <p:blipFill>
+          <a:blip r:embed="rId3">
+            <a:extLst>
+              <a:ext uri="{28A0092B-C50C-407E-A947-70E740481C1C}">
+                <a14:useLocalDpi xmlns:a14="http://schemas.microsoft.com/office/drawing/2010/main" val="0"/>
+              </a:ext>
+            </a:extLst>
+          </a:blip>
+          <a:srcRect/>
+          <a:stretch>
+            <a:fillRect/>
+          </a:stretch>
+        </p:blipFill>
+        <p:spPr bwMode="auto">
+          <a:xfrm>
+            <a:off x="4238625" y="1295400"/>
+            <a:ext cx="4981575" cy="4639398"/>
+          </a:xfrm>
+          <a:prstGeom prst="rect">
+            <a:avLst/>
+          </a:prstGeom>
+          <a:noFill/>
+          <a:ln>
+            <a:noFill/>
+          </a:ln>
+          <a:extLst>
+            <a:ext uri="{909E8E84-426E-40DD-AFC4-6F175D3DCCD1}">
+              <a14:hiddenFill xmlns:a14="http://schemas.microsoft.com/office/drawing/2010/main">
+                <a:solidFill>
+                  <a:schemeClr val="accent1"/>
+                </a:solidFill>
+              </a14:hiddenFill>
+            </a:ext>
+            <a:ext uri="{91240B29-F687-4F45-9708-019B960494DF}">
+              <a14:hiddenLine xmlns:a14="http://schemas.microsoft.com/office/drawing/2010/main" w="9525">
+                <a:solidFill>
+                  <a:schemeClr val="tx1"/>
+                </a:solidFill>
+                <a:miter lim="800000"/>
+                <a:headEnd/>
+                <a:tailEnd/>
+              </a14:hiddenLine>
+            </a:ext>
+          </a:extLst>
+        </p:spPr>
+      </p:pic>
+    </p:spTree>
+    <p:extLst>
+      <p:ext uri="{BB962C8B-B14F-4D97-AF65-F5344CB8AC3E}">
+        <p14:creationId xmlns:p14="http://schemas.microsoft.com/office/powerpoint/2010/main" val="2873884742"/>
+      </p:ext>
+    </p:extLst>
+  </p:cSld>
+  <p:clrMapOvr>
+    <a:masterClrMapping/>
+  </p:clrMapOvr>
+  <p:timing>
+    <p:tnLst>
+      <p:par>
+        <p:cTn id="1" dur="indefinite" restart="never" nodeType="tmRoot"/>
+      </p:par>
+    </p:tnLst>
+  </p:timing>
+</p:sld>
+</file>
+
+<file path=ppt/slides/slide12.xml><?xml version="1.0" encoding="utf-8"?>
+<p:sld xmlns:a="http://schemas.openxmlformats.org/drawingml/2006/main" xmlns:r="http://schemas.openxmlformats.org/officeDocument/2006/relationships" xmlns:p="http://schemas.openxmlformats.org/presentationml/2006/main">
+  <p:cSld>
+    <p:spTree>
+      <p:nvGrpSpPr>
+        <p:cNvPr id="1" name=""/>
+        <p:cNvGrpSpPr/>
+        <p:nvPr/>
+      </p:nvGrpSpPr>
+      <p:grpSpPr>
+        <a:xfrm>
+          <a:off x="0" y="0"/>
+          <a:ext cx="0" cy="0"/>
+          <a:chOff x="0" y="0"/>
+          <a:chExt cx="0" cy="0"/>
+        </a:xfrm>
+      </p:grpSpPr>
+      <p:sp>
+        <p:nvSpPr>
+          <p:cNvPr id="7" name="Title 1"/>
+          <p:cNvSpPr>
+            <a:spLocks noGrp="1"/>
+          </p:cNvSpPr>
+          <p:nvPr>
+            <p:ph type="title"/>
+          </p:nvPr>
+        </p:nvSpPr>
+        <p:spPr>
+          <a:xfrm>
+            <a:off x="0" y="0"/>
+            <a:ext cx="9144000" cy="914400"/>
+          </a:xfrm>
+        </p:spPr>
+        <p:txBody>
+          <a:bodyPr>
+            <a:noAutofit/>
+          </a:bodyPr>
+          <a:lstStyle/>
+          <a:p>
+            <a:r>
+              <a:rPr lang="en-US" sz="2400" b="1" dirty="0" smtClean="0"/>
+              <a:t>Distribution of db5 Regulatory Weights</a:t>
+            </a:r>
+            <a:br>
+              <a:rPr lang="en-US" sz="2400" b="1" dirty="0" smtClean="0"/>
+            </a:br>
+            <a:r>
+              <a:rPr lang="en-US" sz="2400" dirty="0" smtClean="0"/>
+              <a:t>Network: 15 Genes, 28 Edges</a:t>
+            </a:r>
+            <a:endParaRPr lang="en-US" sz="2400" b="1" dirty="0"/>
+          </a:p>
+        </p:txBody>
+      </p:sp>
+      <p:pic>
+        <p:nvPicPr>
+          <p:cNvPr id="2" name="Picture 2"/>
+          <p:cNvPicPr>
+            <a:picLocks noChangeAspect="1" noChangeArrowheads="1"/>
+          </p:cNvPicPr>
+          <p:nvPr/>
+        </p:nvPicPr>
+        <p:blipFill>
+          <a:blip r:embed="rId2">
+            <a:extLst>
+              <a:ext uri="{28A0092B-C50C-407E-A947-70E740481C1C}">
+                <a14:useLocalDpi xmlns:a14="http://schemas.microsoft.com/office/drawing/2010/main" val="0"/>
+              </a:ext>
+            </a:extLst>
+          </a:blip>
+          <a:srcRect/>
+          <a:stretch>
+            <a:fillRect/>
+          </a:stretch>
+        </p:blipFill>
+        <p:spPr bwMode="auto">
+          <a:xfrm>
+            <a:off x="-76200" y="1219199"/>
+            <a:ext cx="5486400" cy="4810125"/>
+          </a:xfrm>
+          <a:prstGeom prst="rect">
+            <a:avLst/>
+          </a:prstGeom>
+          <a:noFill/>
+          <a:ln>
+            <a:noFill/>
+          </a:ln>
+          <a:extLst>
+            <a:ext uri="{909E8E84-426E-40DD-AFC4-6F175D3DCCD1}">
+              <a14:hiddenFill xmlns:a14="http://schemas.microsoft.com/office/drawing/2010/main">
+                <a:solidFill>
+                  <a:schemeClr val="accent1"/>
+                </a:solidFill>
+              </a14:hiddenFill>
+            </a:ext>
+            <a:ext uri="{91240B29-F687-4F45-9708-019B960494DF}">
+              <a14:hiddenLine xmlns:a14="http://schemas.microsoft.com/office/drawing/2010/main" w="9525">
+                <a:solidFill>
+                  <a:schemeClr val="tx1"/>
+                </a:solidFill>
+                <a:miter lim="800000"/>
+                <a:headEnd/>
+                <a:tailEnd/>
+              </a14:hiddenLine>
+            </a:ext>
+          </a:extLst>
+        </p:spPr>
+      </p:pic>
+      <p:pic>
+        <p:nvPicPr>
+          <p:cNvPr id="3" name="Picture 3"/>
+          <p:cNvPicPr>
+            <a:picLocks noChangeAspect="1" noChangeArrowheads="1"/>
+          </p:cNvPicPr>
+          <p:nvPr/>
+        </p:nvPicPr>
+        <p:blipFill>
+          <a:blip r:embed="rId3">
+            <a:extLst>
+              <a:ext uri="{28A0092B-C50C-407E-A947-70E740481C1C}">
+                <a14:useLocalDpi xmlns:a14="http://schemas.microsoft.com/office/drawing/2010/main" val="0"/>
+              </a:ext>
+            </a:extLst>
+          </a:blip>
+          <a:srcRect/>
+          <a:stretch>
+            <a:fillRect/>
+          </a:stretch>
+        </p:blipFill>
+        <p:spPr bwMode="auto">
+          <a:xfrm>
+            <a:off x="4114800" y="1219200"/>
+            <a:ext cx="5181600" cy="4810125"/>
+          </a:xfrm>
+          <a:prstGeom prst="rect">
+            <a:avLst/>
+          </a:prstGeom>
+          <a:noFill/>
+          <a:ln>
+            <a:noFill/>
+          </a:ln>
+          <a:extLst>
+            <a:ext uri="{909E8E84-426E-40DD-AFC4-6F175D3DCCD1}">
+              <a14:hiddenFill xmlns:a14="http://schemas.microsoft.com/office/drawing/2010/main">
+                <a:solidFill>
+                  <a:schemeClr val="accent1"/>
+                </a:solidFill>
+              </a14:hiddenFill>
+            </a:ext>
+            <a:ext uri="{91240B29-F687-4F45-9708-019B960494DF}">
+              <a14:hiddenLine xmlns:a14="http://schemas.microsoft.com/office/drawing/2010/main" w="9525">
+                <a:solidFill>
+                  <a:schemeClr val="tx1"/>
+                </a:solidFill>
+                <a:miter lim="800000"/>
+                <a:headEnd/>
+                <a:tailEnd/>
+              </a14:hiddenLine>
+            </a:ext>
+          </a:extLst>
+        </p:spPr>
+      </p:pic>
+    </p:spTree>
+    <p:extLst>
+      <p:ext uri="{BB962C8B-B14F-4D97-AF65-F5344CB8AC3E}">
+        <p14:creationId xmlns:p14="http://schemas.microsoft.com/office/powerpoint/2010/main" val="3078101635"/>
+      </p:ext>
+    </p:extLst>
+  </p:cSld>
+  <p:clrMapOvr>
+    <a:masterClrMapping/>
+  </p:clrMapOvr>
+  <p:timing>
+    <p:tnLst>
+      <p:par>
+        <p:cTn id="1" dur="indefinite" restart="never" nodeType="tmRoot"/>
+      </p:par>
+    </p:tnLst>
+  </p:timing>
+</p:sld>
+</file>
+
+<file path=ppt/slides/slide13.xml><?xml version="1.0" encoding="utf-8"?>
+<p:sld xmlns:a="http://schemas.openxmlformats.org/drawingml/2006/main" xmlns:r="http://schemas.openxmlformats.org/officeDocument/2006/relationships" xmlns:p="http://schemas.openxmlformats.org/presentationml/2006/main">
+  <p:cSld>
+    <p:spTree>
+      <p:nvGrpSpPr>
+        <p:cNvPr id="1" name=""/>
+        <p:cNvGrpSpPr/>
+        <p:nvPr/>
+      </p:nvGrpSpPr>
+      <p:grpSpPr>
+        <a:xfrm>
+          <a:off x="0" y="0"/>
+          <a:ext cx="0" cy="0"/>
+          <a:chOff x="0" y="0"/>
+          <a:chExt cx="0" cy="0"/>
+        </a:xfrm>
+      </p:grpSpPr>
+      <p:sp>
+        <p:nvSpPr>
+          <p:cNvPr id="6" name="Title 1"/>
+          <p:cNvSpPr>
+            <a:spLocks noGrp="1"/>
+          </p:cNvSpPr>
+          <p:nvPr>
+            <p:ph type="title"/>
+          </p:nvPr>
+        </p:nvSpPr>
+        <p:spPr>
+          <a:xfrm>
+            <a:off x="0" y="0"/>
+            <a:ext cx="9144000" cy="914400"/>
+          </a:xfrm>
+        </p:spPr>
+        <p:txBody>
+          <a:bodyPr>
+            <a:noAutofit/>
+          </a:bodyPr>
+          <a:lstStyle/>
+          <a:p>
+            <a:r>
+              <a:rPr lang="en-US" sz="2400" b="1" dirty="0" smtClean="0"/>
+              <a:t>Distribution of db6 Regulatory Weights</a:t>
+            </a:r>
+            <a:r>
+              <a:rPr lang="en-US" sz="2400" dirty="0" smtClean="0"/>
+              <a:t/>
+            </a:r>
+            <a:br>
+              <a:rPr lang="en-US" sz="2400" dirty="0" smtClean="0"/>
+            </a:br>
+            <a:r>
+              <a:rPr lang="en-US" sz="2400" dirty="0" smtClean="0"/>
+              <a:t>Network: 16 Genes, 27 Edges</a:t>
+            </a:r>
+            <a:endParaRPr lang="en-US" sz="2400" dirty="0"/>
+          </a:p>
+        </p:txBody>
+      </p:sp>
+      <p:pic>
+        <p:nvPicPr>
+          <p:cNvPr id="6146" name="Picture 2"/>
+          <p:cNvPicPr>
+            <a:picLocks noChangeAspect="1" noChangeArrowheads="1"/>
+          </p:cNvPicPr>
+          <p:nvPr/>
+        </p:nvPicPr>
+        <p:blipFill>
+          <a:blip r:embed="rId2">
+            <a:extLst>
+              <a:ext uri="{28A0092B-C50C-407E-A947-70E740481C1C}">
+                <a14:useLocalDpi xmlns:a14="http://schemas.microsoft.com/office/drawing/2010/main" val="0"/>
+              </a:ext>
+            </a:extLst>
+          </a:blip>
+          <a:srcRect/>
+          <a:stretch>
+            <a:fillRect/>
+          </a:stretch>
+        </p:blipFill>
+        <p:spPr bwMode="auto">
+          <a:xfrm>
+            <a:off x="-76200" y="1295400"/>
+            <a:ext cx="5408576" cy="4762500"/>
+          </a:xfrm>
+          <a:prstGeom prst="rect">
+            <a:avLst/>
+          </a:prstGeom>
+          <a:noFill/>
+          <a:ln>
+            <a:noFill/>
+          </a:ln>
+          <a:extLst>
+            <a:ext uri="{909E8E84-426E-40DD-AFC4-6F175D3DCCD1}">
+              <a14:hiddenFill xmlns:a14="http://schemas.microsoft.com/office/drawing/2010/main">
+                <a:solidFill>
+                  <a:schemeClr val="accent1"/>
+                </a:solidFill>
+              </a14:hiddenFill>
+            </a:ext>
+            <a:ext uri="{91240B29-F687-4F45-9708-019B960494DF}">
+              <a14:hiddenLine xmlns:a14="http://schemas.microsoft.com/office/drawing/2010/main" w="9525">
+                <a:solidFill>
+                  <a:schemeClr val="tx1"/>
+                </a:solidFill>
+                <a:miter lim="800000"/>
+                <a:headEnd/>
+                <a:tailEnd/>
+              </a14:hiddenLine>
+            </a:ext>
+          </a:extLst>
+        </p:spPr>
+      </p:pic>
+      <p:pic>
+        <p:nvPicPr>
+          <p:cNvPr id="6147" name="Picture 3"/>
+          <p:cNvPicPr>
+            <a:picLocks noChangeAspect="1" noChangeArrowheads="1"/>
+          </p:cNvPicPr>
+          <p:nvPr/>
+        </p:nvPicPr>
+        <p:blipFill>
+          <a:blip r:embed="rId3">
+            <a:extLst>
+              <a:ext uri="{28A0092B-C50C-407E-A947-70E740481C1C}">
+                <a14:useLocalDpi xmlns:a14="http://schemas.microsoft.com/office/drawing/2010/main" val="0"/>
+              </a:ext>
+            </a:extLst>
+          </a:blip>
+          <a:srcRect/>
+          <a:stretch>
+            <a:fillRect/>
+          </a:stretch>
+        </p:blipFill>
+        <p:spPr bwMode="auto">
+          <a:xfrm>
+            <a:off x="4191000" y="1416934"/>
+            <a:ext cx="5105400" cy="4679066"/>
+          </a:xfrm>
+          <a:prstGeom prst="rect">
+            <a:avLst/>
+          </a:prstGeom>
+          <a:noFill/>
+          <a:ln>
+            <a:noFill/>
+          </a:ln>
+          <a:extLst>
+            <a:ext uri="{909E8E84-426E-40DD-AFC4-6F175D3DCCD1}">
+              <a14:hiddenFill xmlns:a14="http://schemas.microsoft.com/office/drawing/2010/main">
+                <a:solidFill>
+                  <a:schemeClr val="accent1"/>
+                </a:solidFill>
+              </a14:hiddenFill>
+            </a:ext>
+            <a:ext uri="{91240B29-F687-4F45-9708-019B960494DF}">
+              <a14:hiddenLine xmlns:a14="http://schemas.microsoft.com/office/drawing/2010/main" w="9525">
+                <a:solidFill>
+                  <a:schemeClr val="tx1"/>
+                </a:solidFill>
+                <a:miter lim="800000"/>
+                <a:headEnd/>
+                <a:tailEnd/>
+              </a14:hiddenLine>
+            </a:ext>
+          </a:extLst>
+        </p:spPr>
+      </p:pic>
+    </p:spTree>
+    <p:extLst>
+      <p:ext uri="{BB962C8B-B14F-4D97-AF65-F5344CB8AC3E}">
+        <p14:creationId xmlns:p14="http://schemas.microsoft.com/office/powerpoint/2010/main" val="994951438"/>
+      </p:ext>
+    </p:extLst>
+  </p:cSld>
+  <p:clrMapOvr>
+    <a:masterClrMapping/>
+  </p:clrMapOvr>
+  <p:timing>
+    <p:tnLst>
+      <p:par>
+        <p:cTn id="1" dur="indefinite" restart="never" nodeType="tmRoot"/>
+      </p:par>
+    </p:tnLst>
+  </p:timing>
+</p:sld>
+</file>
+
+<file path=ppt/slides/slide14.xml><?xml version="1.0" encoding="utf-8"?>
+<p:sld xmlns:a="http://schemas.openxmlformats.org/drawingml/2006/main" xmlns:r="http://schemas.openxmlformats.org/officeDocument/2006/relationships" xmlns:p="http://schemas.openxmlformats.org/presentationml/2006/main">
+  <p:cSld>
+    <p:spTree>
+      <p:nvGrpSpPr>
+        <p:cNvPr id="1" name=""/>
+        <p:cNvGrpSpPr/>
+        <p:nvPr/>
+      </p:nvGrpSpPr>
+      <p:grpSpPr>
+        <a:xfrm>
+          <a:off x="0" y="0"/>
+          <a:ext cx="0" cy="0"/>
+          <a:chOff x="0" y="0"/>
+          <a:chExt cx="0" cy="0"/>
+        </a:xfrm>
+      </p:grpSpPr>
+      <p:sp>
+        <p:nvSpPr>
+          <p:cNvPr id="6" name="Title 1"/>
+          <p:cNvSpPr>
+            <a:spLocks noGrp="1"/>
+          </p:cNvSpPr>
+          <p:nvPr>
+            <p:ph type="title"/>
+          </p:nvPr>
+        </p:nvSpPr>
+        <p:spPr>
+          <a:xfrm>
+            <a:off x="0" y="0"/>
+            <a:ext cx="9144000" cy="914400"/>
+          </a:xfrm>
+        </p:spPr>
+        <p:txBody>
+          <a:bodyPr>
+            <a:noAutofit/>
+          </a:bodyPr>
+          <a:lstStyle/>
+          <a:p>
+            <a:r>
+              <a:rPr lang="en-US" sz="2400" b="1" dirty="0" smtClean="0"/>
+              <a:t>Distribution of db6 Regulatory Weights</a:t>
+            </a:r>
+            <a:r>
+              <a:rPr lang="en-US" sz="2400" dirty="0" smtClean="0"/>
+              <a:t/>
+            </a:r>
+            <a:br>
+              <a:rPr lang="en-US" sz="2400" dirty="0" smtClean="0"/>
+            </a:br>
+            <a:r>
+              <a:rPr lang="en-US" sz="2400" dirty="0" smtClean="0"/>
+              <a:t>Network: 16 Genes, 27 Edges</a:t>
+            </a:r>
+            <a:endParaRPr lang="en-US" sz="2400" dirty="0"/>
+          </a:p>
+        </p:txBody>
+      </p:sp>
+      <p:pic>
+        <p:nvPicPr>
+          <p:cNvPr id="2" name="Picture 2"/>
+          <p:cNvPicPr>
+            <a:picLocks noChangeAspect="1" noChangeArrowheads="1"/>
+          </p:cNvPicPr>
+          <p:nvPr/>
+        </p:nvPicPr>
+        <p:blipFill>
+          <a:blip r:embed="rId2">
+            <a:extLst>
+              <a:ext uri="{28A0092B-C50C-407E-A947-70E740481C1C}">
+                <a14:useLocalDpi xmlns:a14="http://schemas.microsoft.com/office/drawing/2010/main" val="0"/>
+              </a:ext>
+            </a:extLst>
+          </a:blip>
+          <a:srcRect/>
+          <a:stretch>
+            <a:fillRect/>
+          </a:stretch>
+        </p:blipFill>
+        <p:spPr bwMode="auto">
+          <a:xfrm>
+            <a:off x="-44067" y="1432193"/>
+            <a:ext cx="5486400" cy="4810125"/>
+          </a:xfrm>
+          <a:prstGeom prst="rect">
+            <a:avLst/>
+          </a:prstGeom>
+          <a:noFill/>
+          <a:ln>
+            <a:noFill/>
+          </a:ln>
+          <a:extLst>
+            <a:ext uri="{909E8E84-426E-40DD-AFC4-6F175D3DCCD1}">
+              <a14:hiddenFill xmlns:a14="http://schemas.microsoft.com/office/drawing/2010/main">
+                <a:solidFill>
+                  <a:schemeClr val="accent1"/>
+                </a:solidFill>
+              </a14:hiddenFill>
+            </a:ext>
+            <a:ext uri="{91240B29-F687-4F45-9708-019B960494DF}">
+              <a14:hiddenLine xmlns:a14="http://schemas.microsoft.com/office/drawing/2010/main" w="9525">
+                <a:solidFill>
+                  <a:schemeClr val="tx1"/>
+                </a:solidFill>
+                <a:miter lim="800000"/>
+                <a:headEnd/>
+                <a:tailEnd/>
+              </a14:hiddenLine>
+            </a:ext>
+          </a:extLst>
+        </p:spPr>
+      </p:pic>
+      <p:pic>
+        <p:nvPicPr>
+          <p:cNvPr id="3" name="Picture 3"/>
+          <p:cNvPicPr>
+            <a:picLocks noChangeAspect="1" noChangeArrowheads="1"/>
+          </p:cNvPicPr>
+          <p:nvPr/>
+        </p:nvPicPr>
+        <p:blipFill>
+          <a:blip r:embed="rId3">
+            <a:extLst>
+              <a:ext uri="{28A0092B-C50C-407E-A947-70E740481C1C}">
+                <a14:useLocalDpi xmlns:a14="http://schemas.microsoft.com/office/drawing/2010/main" val="0"/>
+              </a:ext>
+            </a:extLst>
+          </a:blip>
+          <a:srcRect/>
+          <a:stretch>
+            <a:fillRect/>
+          </a:stretch>
+        </p:blipFill>
+        <p:spPr bwMode="auto">
+          <a:xfrm>
+            <a:off x="4191001" y="1504950"/>
+            <a:ext cx="4953000" cy="4819650"/>
+          </a:xfrm>
+          <a:prstGeom prst="rect">
+            <a:avLst/>
+          </a:prstGeom>
+          <a:noFill/>
+          <a:ln>
+            <a:noFill/>
+          </a:ln>
+          <a:extLst>
+            <a:ext uri="{909E8E84-426E-40DD-AFC4-6F175D3DCCD1}">
+              <a14:hiddenFill xmlns:a14="http://schemas.microsoft.com/office/drawing/2010/main">
+                <a:solidFill>
+                  <a:schemeClr val="accent1"/>
+                </a:solidFill>
+              </a14:hiddenFill>
+            </a:ext>
+            <a:ext uri="{91240B29-F687-4F45-9708-019B960494DF}">
+              <a14:hiddenLine xmlns:a14="http://schemas.microsoft.com/office/drawing/2010/main" w="9525">
+                <a:solidFill>
+                  <a:schemeClr val="tx1"/>
+                </a:solidFill>
+                <a:miter lim="800000"/>
+                <a:headEnd/>
+                <a:tailEnd/>
+              </a14:hiddenLine>
+            </a:ext>
+          </a:extLst>
+        </p:spPr>
+      </p:pic>
+    </p:spTree>
+    <p:extLst>
+      <p:ext uri="{BB962C8B-B14F-4D97-AF65-F5344CB8AC3E}">
+        <p14:creationId xmlns:p14="http://schemas.microsoft.com/office/powerpoint/2010/main" val="701021082"/>
       </p:ext>
     </p:extLst>
   </p:cSld>
@@ -3234,54 +4154,42 @@
             <p:ph idx="1"/>
           </p:nvPr>
         </p:nvSpPr>
-        <p:spPr/>
+        <p:spPr>
+          <a:xfrm>
+            <a:off x="457200" y="1600200"/>
+            <a:ext cx="8458200" cy="4525963"/>
+          </a:xfrm>
+        </p:spPr>
         <p:txBody>
           <a:bodyPr/>
           <a:lstStyle/>
           <a:p>
             <a:r>
               <a:rPr lang="en-US" dirty="0" smtClean="0"/>
-              <a:t>Network names adjusted to db1-db6.</a:t>
-            </a:r>
-          </a:p>
-          <a:p>
+              <a:t>Fixed </a:t>
+            </a:r>
+            <a:r>
+              <a:rPr lang="en-US" dirty="0"/>
+              <a:t>bin </a:t>
+            </a:r>
             <a:r>
               <a:rPr lang="en-US" dirty="0" smtClean="0"/>
-              <a:t>Normalized weight values were scaled *100.</a:t>
-            </a:r>
+              <a:t>interval=20.</a:t>
+            </a:r>
+            <a:endParaRPr lang="en-US" dirty="0" smtClean="0"/>
           </a:p>
           <a:p>
             <a:r>
               <a:rPr lang="en-US" dirty="0" smtClean="0"/>
-              <a:t>Maximum values written as +/- 99.99.</a:t>
-            </a:r>
-          </a:p>
-          <a:p>
-            <a:r>
-              <a:rPr lang="en-US" dirty="0"/>
-              <a:t>Fixed bin interval=10</a:t>
-            </a:r>
+              <a:t>Cumulative percentage line graphs generated.</a:t>
+            </a:r>
+          </a:p>
+          <a:p>
+            <a:pPr lvl="1"/>
             <a:r>
               <a:rPr lang="en-US" dirty="0" smtClean="0"/>
-              <a:t>.</a:t>
-            </a:r>
-          </a:p>
-          <a:p>
-            <a:r>
-              <a:rPr lang="en-US" dirty="0" smtClean="0"/>
-              <a:t>Color coding only for activation &amp; repression.</a:t>
-            </a:r>
-          </a:p>
-          <a:p>
-            <a:r>
-              <a:rPr lang="en-US" smtClean="0"/>
-              <a:t>Cumulative frequency graphs </a:t>
-            </a:r>
-            <a:r>
-              <a:rPr lang="en-US" dirty="0" smtClean="0"/>
-              <a:t>generated.</a:t>
-            </a:r>
-            <a:endParaRPr lang="en-US" dirty="0"/>
+              <a:t>Problem: could not find a simple way to plot a smooth curve.</a:t>
+            </a:r>
           </a:p>
         </p:txBody>
       </p:sp>
@@ -3346,15 +4254,7 @@
           <a:p>
             <a:r>
               <a:rPr lang="en-US" sz="2400" b="1" dirty="0" smtClean="0"/>
-              <a:t>Distribution of </a:t>
-            </a:r>
-            <a:r>
-              <a:rPr lang="en-US" sz="2400" b="1" dirty="0" smtClean="0"/>
-              <a:t>db1 Regulatory </a:t>
-            </a:r>
-            <a:r>
-              <a:rPr lang="en-US" sz="2400" b="1" dirty="0" smtClean="0"/>
-              <a:t>Weights</a:t>
+              <a:t>Distribution of db1 Regulatory Weights</a:t>
             </a:r>
             <a:br>
               <a:rPr lang="en-US" sz="2400" b="1" dirty="0" smtClean="0"/>
@@ -3514,7 +4414,7 @@
       </p:grpSpPr>
       <p:sp>
         <p:nvSpPr>
-          <p:cNvPr id="7" name="Title 1"/>
+          <p:cNvPr id="2" name="Title 1"/>
           <p:cNvSpPr>
             <a:spLocks noGrp="1"/>
           </p:cNvSpPr>
@@ -3536,34 +4436,22 @@
           <a:p>
             <a:r>
               <a:rPr lang="en-US" sz="2400" b="1" dirty="0" smtClean="0"/>
-              <a:t>Distribution of </a:t>
-            </a:r>
-            <a:r>
-              <a:rPr lang="en-US" sz="2400" b="1" dirty="0" smtClean="0"/>
-              <a:t>db2 </a:t>
-            </a:r>
-            <a:r>
-              <a:rPr lang="en-US" sz="2400" b="1" dirty="0" smtClean="0"/>
-              <a:t>Regulatory </a:t>
-            </a:r>
-            <a:r>
-              <a:rPr lang="en-US" sz="2400" b="1" dirty="0" smtClean="0"/>
-              <a:t>Weights</a:t>
+              <a:t>Distribution of db1 Regulatory Weights</a:t>
             </a:r>
             <a:br>
               <a:rPr lang="en-US" sz="2400" b="1" dirty="0" smtClean="0"/>
             </a:br>
             <a:r>
               <a:rPr lang="en-US" sz="2400" dirty="0" smtClean="0"/>
-              <a:t>Network: 14 Genes, 25 Edges</a:t>
-            </a:r>
-            <a:endParaRPr lang="en-US" sz="2400" b="1" dirty="0"/>
+              <a:t>Network: 16 Genes, 36 Edges</a:t>
+            </a:r>
+            <a:endParaRPr lang="en-US" sz="2400" dirty="0"/>
           </a:p>
         </p:txBody>
       </p:sp>
       <p:pic>
         <p:nvPicPr>
-          <p:cNvPr id="2050" name="Picture 2"/>
+          <p:cNvPr id="4" name="Picture 2"/>
           <p:cNvPicPr>
             <a:picLocks noChangeAspect="1" noChangeArrowheads="1"/>
           </p:cNvPicPr>
@@ -3584,8 +4472,8 @@
         </p:blipFill>
         <p:spPr bwMode="auto">
           <a:xfrm>
-            <a:off x="-152400" y="1071562"/>
-            <a:ext cx="5359547" cy="4829175"/>
+            <a:off x="-76200" y="1095375"/>
+            <a:ext cx="5448300" cy="4772025"/>
           </a:xfrm>
           <a:prstGeom prst="rect">
             <a:avLst/>
@@ -3617,13 +4505,13 @@
       </p:pic>
       <p:pic>
         <p:nvPicPr>
-          <p:cNvPr id="2051" name="Picture 3"/>
+          <p:cNvPr id="1027" name="Picture 3"/>
           <p:cNvPicPr>
             <a:picLocks noChangeAspect="1" noChangeArrowheads="1"/>
           </p:cNvPicPr>
           <p:nvPr/>
         </p:nvPicPr>
-        <p:blipFill>
+        <p:blipFill rotWithShape="1">
           <a:blip r:embed="rId3">
             <a:extLst>
               <a:ext uri="{28A0092B-C50C-407E-A947-70E740481C1C}">
@@ -3631,15 +4519,13 @@
               </a:ext>
             </a:extLst>
           </a:blip>
-          <a:srcRect/>
-          <a:stretch>
-            <a:fillRect/>
-          </a:stretch>
+          <a:srcRect l="2470"/>
+          <a:stretch/>
         </p:blipFill>
         <p:spPr bwMode="auto">
           <a:xfrm>
-            <a:off x="4038600" y="1143000"/>
-            <a:ext cx="5251938" cy="4754880"/>
+            <a:off x="4267200" y="1181100"/>
+            <a:ext cx="4953000" cy="4762500"/>
           </a:xfrm>
           <a:prstGeom prst="rect">
             <a:avLst/>
@@ -3672,7 +4558,7 @@
     </p:spTree>
     <p:extLst>
       <p:ext uri="{BB962C8B-B14F-4D97-AF65-F5344CB8AC3E}">
-        <p14:creationId xmlns:p14="http://schemas.microsoft.com/office/powerpoint/2010/main" val="2025778162"/>
+        <p14:creationId xmlns:p14="http://schemas.microsoft.com/office/powerpoint/2010/main" val="4074790481"/>
       </p:ext>
     </p:extLst>
   </p:cSld>
@@ -3708,7 +4594,7 @@
       </p:grpSpPr>
       <p:sp>
         <p:nvSpPr>
-          <p:cNvPr id="6" name="Title 1"/>
+          <p:cNvPr id="7" name="Title 1"/>
           <p:cNvSpPr>
             <a:spLocks noGrp="1"/>
           </p:cNvSpPr>
@@ -3730,34 +4616,22 @@
           <a:p>
             <a:r>
               <a:rPr lang="en-US" sz="2400" b="1" dirty="0" smtClean="0"/>
-              <a:t>Distribution of </a:t>
-            </a:r>
-            <a:r>
+              <a:t>Distribution of db2 Regulatory Weights</a:t>
+            </a:r>
+            <a:br>
               <a:rPr lang="en-US" sz="2400" b="1" dirty="0" smtClean="0"/>
-              <a:t>db3 Regulatory </a:t>
-            </a:r>
-            <a:r>
-              <a:rPr lang="en-US" sz="2400" b="1" dirty="0" smtClean="0"/>
-              <a:t>Weights</a:t>
-            </a:r>
+            </a:br>
             <a:r>
               <a:rPr lang="en-US" sz="2400" dirty="0" smtClean="0"/>
-              <a:t/>
-            </a:r>
-            <a:br>
-              <a:rPr lang="en-US" sz="2400" dirty="0" smtClean="0"/>
-            </a:br>
-            <a:r>
-              <a:rPr lang="en-US" sz="2400" dirty="0" smtClean="0"/>
-              <a:t>Network: 17 Genes, 32 Edges</a:t>
-            </a:r>
-            <a:endParaRPr lang="en-US" sz="2400" dirty="0"/>
+              <a:t>Network: 14 Genes, 25 Edges</a:t>
+            </a:r>
+            <a:endParaRPr lang="en-US" sz="2400" b="1" dirty="0"/>
           </a:p>
         </p:txBody>
       </p:sp>
       <p:pic>
         <p:nvPicPr>
-          <p:cNvPr id="3074" name="Picture 2"/>
+          <p:cNvPr id="2050" name="Picture 2"/>
           <p:cNvPicPr>
             <a:picLocks noChangeAspect="1" noChangeArrowheads="1"/>
           </p:cNvPicPr>
@@ -3778,8 +4652,8 @@
         </p:blipFill>
         <p:spPr bwMode="auto">
           <a:xfrm>
-            <a:off x="-125194" y="1280160"/>
-            <a:ext cx="5382994" cy="4663440"/>
+            <a:off x="-152400" y="1071562"/>
+            <a:ext cx="5359547" cy="4829175"/>
           </a:xfrm>
           <a:prstGeom prst="rect">
             <a:avLst/>
@@ -3811,7 +4685,7 @@
       </p:pic>
       <p:pic>
         <p:nvPicPr>
-          <p:cNvPr id="3075" name="Picture 3"/>
+          <p:cNvPr id="2051" name="Picture 3"/>
           <p:cNvPicPr>
             <a:picLocks noChangeAspect="1" noChangeArrowheads="1"/>
           </p:cNvPicPr>
@@ -3832,8 +4706,8 @@
         </p:blipFill>
         <p:spPr bwMode="auto">
           <a:xfrm>
-            <a:off x="4114800" y="1341459"/>
-            <a:ext cx="5334000" cy="4630716"/>
+            <a:off x="4038600" y="1143000"/>
+            <a:ext cx="5251938" cy="4754880"/>
           </a:xfrm>
           <a:prstGeom prst="rect">
             <a:avLst/>
@@ -3866,7 +4740,7 @@
     </p:spTree>
     <p:extLst>
       <p:ext uri="{BB962C8B-B14F-4D97-AF65-F5344CB8AC3E}">
-        <p14:creationId xmlns:p14="http://schemas.microsoft.com/office/powerpoint/2010/main" val="108153782"/>
+        <p14:creationId xmlns:p14="http://schemas.microsoft.com/office/powerpoint/2010/main" val="2025778162"/>
       </p:ext>
     </p:extLst>
   </p:cSld>
@@ -3924,22 +4798,14 @@
           <a:p>
             <a:r>
               <a:rPr lang="en-US" sz="2400" b="1" dirty="0" smtClean="0"/>
-              <a:t>Distribution of </a:t>
-            </a:r>
-            <a:r>
-              <a:rPr lang="en-US" sz="2400" b="1" dirty="0" smtClean="0"/>
-              <a:t>db4 Regulatory </a:t>
-            </a:r>
-            <a:r>
-              <a:rPr lang="en-US" sz="2400" b="1" dirty="0" smtClean="0"/>
-              <a:t>Weights</a:t>
+              <a:t>Distribution of db2 Regulatory Weights</a:t>
             </a:r>
             <a:br>
               <a:rPr lang="en-US" sz="2400" b="1" dirty="0" smtClean="0"/>
             </a:br>
             <a:r>
               <a:rPr lang="en-US" sz="2400" dirty="0" smtClean="0"/>
-              <a:t>Network: 14 Genes, 35 Edges</a:t>
+              <a:t>Network: 14 Genes, 25 Edges</a:t>
             </a:r>
             <a:endParaRPr lang="en-US" sz="2400" b="1" dirty="0"/>
           </a:p>
@@ -3947,7 +4813,7 @@
       </p:sp>
       <p:pic>
         <p:nvPicPr>
-          <p:cNvPr id="4098" name="Picture 2"/>
+          <p:cNvPr id="2" name="Picture 2"/>
           <p:cNvPicPr>
             <a:picLocks noChangeAspect="1" noChangeArrowheads="1"/>
           </p:cNvPicPr>
@@ -3968,8 +4834,8 @@
         </p:blipFill>
         <p:spPr bwMode="auto">
           <a:xfrm>
-            <a:off x="-69692" y="1345264"/>
-            <a:ext cx="5251292" cy="4607859"/>
+            <a:off x="9525" y="1219200"/>
+            <a:ext cx="5476875" cy="4772025"/>
           </a:xfrm>
           <a:prstGeom prst="rect">
             <a:avLst/>
@@ -4001,7 +4867,7 @@
       </p:pic>
       <p:pic>
         <p:nvPicPr>
-          <p:cNvPr id="4099" name="Picture 3"/>
+          <p:cNvPr id="3" name="Picture 3"/>
           <p:cNvPicPr>
             <a:picLocks noChangeAspect="1" noChangeArrowheads="1"/>
           </p:cNvPicPr>
@@ -4022,8 +4888,8 @@
         </p:blipFill>
         <p:spPr bwMode="auto">
           <a:xfrm>
-            <a:off x="4092221" y="1295400"/>
-            <a:ext cx="5127979" cy="4754880"/>
+            <a:off x="4191000" y="1219200"/>
+            <a:ext cx="5029200" cy="4800600"/>
           </a:xfrm>
           <a:prstGeom prst="rect">
             <a:avLst/>
@@ -4056,7 +4922,7 @@
     </p:spTree>
     <p:extLst>
       <p:ext uri="{BB962C8B-B14F-4D97-AF65-F5344CB8AC3E}">
-        <p14:creationId xmlns:p14="http://schemas.microsoft.com/office/powerpoint/2010/main" val="4088350280"/>
+        <p14:creationId xmlns:p14="http://schemas.microsoft.com/office/powerpoint/2010/main" val="1969435635"/>
       </p:ext>
     </p:extLst>
   </p:cSld>
@@ -4092,7 +4958,7 @@
       </p:grpSpPr>
       <p:sp>
         <p:nvSpPr>
-          <p:cNvPr id="7" name="Title 1"/>
+          <p:cNvPr id="6" name="Title 1"/>
           <p:cNvSpPr>
             <a:spLocks noGrp="1"/>
           </p:cNvSpPr>
@@ -4114,30 +4980,26 @@
           <a:p>
             <a:r>
               <a:rPr lang="en-US" sz="2400" b="1" dirty="0" smtClean="0"/>
-              <a:t>Distribution of </a:t>
-            </a:r>
-            <a:r>
-              <a:rPr lang="en-US" sz="2400" b="1" dirty="0" smtClean="0"/>
-              <a:t>db5 Regulatory </a:t>
-            </a:r>
-            <a:r>
-              <a:rPr lang="en-US" sz="2400" b="1" dirty="0" smtClean="0"/>
-              <a:t>Weights</a:t>
+              <a:t>Distribution of db3 Regulatory Weights</a:t>
+            </a:r>
+            <a:r>
+              <a:rPr lang="en-US" sz="2400" dirty="0" smtClean="0"/>
+              <a:t/>
             </a:r>
             <a:br>
-              <a:rPr lang="en-US" sz="2400" b="1" dirty="0" smtClean="0"/>
+              <a:rPr lang="en-US" sz="2400" dirty="0" smtClean="0"/>
             </a:br>
             <a:r>
               <a:rPr lang="en-US" sz="2400" dirty="0" smtClean="0"/>
-              <a:t>Network: 15 Genes, 28 Edges</a:t>
-            </a:r>
-            <a:endParaRPr lang="en-US" sz="2400" b="1" dirty="0"/>
+              <a:t>Network: 17 Genes, 32 Edges</a:t>
+            </a:r>
+            <a:endParaRPr lang="en-US" sz="2400" dirty="0"/>
           </a:p>
         </p:txBody>
       </p:sp>
       <p:pic>
         <p:nvPicPr>
-          <p:cNvPr id="5122" name="Picture 2"/>
+          <p:cNvPr id="3074" name="Picture 2"/>
           <p:cNvPicPr>
             <a:picLocks noChangeAspect="1" noChangeArrowheads="1"/>
           </p:cNvPicPr>
@@ -4158,8 +5020,8 @@
         </p:blipFill>
         <p:spPr bwMode="auto">
           <a:xfrm>
-            <a:off x="-76200" y="1274548"/>
-            <a:ext cx="5486400" cy="4735727"/>
+            <a:off x="-125194" y="1280160"/>
+            <a:ext cx="5382994" cy="4663440"/>
           </a:xfrm>
           <a:prstGeom prst="rect">
             <a:avLst/>
@@ -4191,7 +5053,7 @@
       </p:pic>
       <p:pic>
         <p:nvPicPr>
-          <p:cNvPr id="5123" name="Picture 3"/>
+          <p:cNvPr id="3075" name="Picture 3"/>
           <p:cNvPicPr>
             <a:picLocks noChangeAspect="1" noChangeArrowheads="1"/>
           </p:cNvPicPr>
@@ -4212,8 +5074,8 @@
         </p:blipFill>
         <p:spPr bwMode="auto">
           <a:xfrm>
-            <a:off x="4238625" y="1295400"/>
-            <a:ext cx="4981575" cy="4639398"/>
+            <a:off x="4114800" y="1341459"/>
+            <a:ext cx="5334000" cy="4630716"/>
           </a:xfrm>
           <a:prstGeom prst="rect">
             <a:avLst/>
@@ -4246,7 +5108,7 @@
     </p:spTree>
     <p:extLst>
       <p:ext uri="{BB962C8B-B14F-4D97-AF65-F5344CB8AC3E}">
-        <p14:creationId xmlns:p14="http://schemas.microsoft.com/office/powerpoint/2010/main" val="2873884742"/>
+        <p14:creationId xmlns:p14="http://schemas.microsoft.com/office/powerpoint/2010/main" val="108153782"/>
       </p:ext>
     </p:extLst>
   </p:cSld>
@@ -4304,15 +5166,7 @@
           <a:p>
             <a:r>
               <a:rPr lang="en-US" sz="2400" b="1" dirty="0" smtClean="0"/>
-              <a:t>Distribution of </a:t>
-            </a:r>
-            <a:r>
-              <a:rPr lang="en-US" sz="2400" b="1" dirty="0" smtClean="0"/>
-              <a:t>db6 Regulatory </a:t>
-            </a:r>
-            <a:r>
-              <a:rPr lang="en-US" sz="2400" b="1" dirty="0" smtClean="0"/>
-              <a:t>Weights</a:t>
+              <a:t>Distribution of db3 Regulatory Weights</a:t>
             </a:r>
             <a:r>
               <a:rPr lang="en-US" sz="2400" dirty="0" smtClean="0"/>
@@ -4323,7 +5177,7 @@
             </a:br>
             <a:r>
               <a:rPr lang="en-US" sz="2400" dirty="0" smtClean="0"/>
-              <a:t>Network: 16 Genes, 27 Edges</a:t>
+              <a:t>Network: 17 Genes, 32 Edges</a:t>
             </a:r>
             <a:endParaRPr lang="en-US" sz="2400" dirty="0"/>
           </a:p>
@@ -4331,7 +5185,7 @@
       </p:sp>
       <p:pic>
         <p:nvPicPr>
-          <p:cNvPr id="6146" name="Picture 2"/>
+          <p:cNvPr id="2" name="Picture 2"/>
           <p:cNvPicPr>
             <a:picLocks noChangeAspect="1" noChangeArrowheads="1"/>
           </p:cNvPicPr>
@@ -4352,8 +5206,8 @@
         </p:blipFill>
         <p:spPr bwMode="auto">
           <a:xfrm>
-            <a:off x="-76200" y="1295400"/>
-            <a:ext cx="5408576" cy="4762500"/>
+            <a:off x="-76200" y="1371599"/>
+            <a:ext cx="5505450" cy="4772025"/>
           </a:xfrm>
           <a:prstGeom prst="rect">
             <a:avLst/>
@@ -4385,7 +5239,7 @@
       </p:pic>
       <p:pic>
         <p:nvPicPr>
-          <p:cNvPr id="6147" name="Picture 3"/>
+          <p:cNvPr id="3" name="Picture 3"/>
           <p:cNvPicPr>
             <a:picLocks noChangeAspect="1" noChangeArrowheads="1"/>
           </p:cNvPicPr>
@@ -4406,8 +5260,8 @@
         </p:blipFill>
         <p:spPr bwMode="auto">
           <a:xfrm>
-            <a:off x="4191000" y="1416934"/>
-            <a:ext cx="5105400" cy="4679066"/>
+            <a:off x="4267201" y="1447800"/>
+            <a:ext cx="5105400" cy="4752975"/>
           </a:xfrm>
           <a:prstGeom prst="rect">
             <a:avLst/>
@@ -4440,7 +5294,189 @@
     </p:spTree>
     <p:extLst>
       <p:ext uri="{BB962C8B-B14F-4D97-AF65-F5344CB8AC3E}">
-        <p14:creationId xmlns:p14="http://schemas.microsoft.com/office/powerpoint/2010/main" val="994951438"/>
+        <p14:creationId xmlns:p14="http://schemas.microsoft.com/office/powerpoint/2010/main" val="3471614042"/>
+      </p:ext>
+    </p:extLst>
+  </p:cSld>
+  <p:clrMapOvr>
+    <a:masterClrMapping/>
+  </p:clrMapOvr>
+  <p:timing>
+    <p:tnLst>
+      <p:par>
+        <p:cTn id="1" dur="indefinite" restart="never" nodeType="tmRoot"/>
+      </p:par>
+    </p:tnLst>
+  </p:timing>
+</p:sld>
+</file>
+
+<file path=ppt/slides/slide9.xml><?xml version="1.0" encoding="utf-8"?>
+<p:sld xmlns:a="http://schemas.openxmlformats.org/drawingml/2006/main" xmlns:r="http://schemas.openxmlformats.org/officeDocument/2006/relationships" xmlns:p="http://schemas.openxmlformats.org/presentationml/2006/main">
+  <p:cSld>
+    <p:spTree>
+      <p:nvGrpSpPr>
+        <p:cNvPr id="1" name=""/>
+        <p:cNvGrpSpPr/>
+        <p:nvPr/>
+      </p:nvGrpSpPr>
+      <p:grpSpPr>
+        <a:xfrm>
+          <a:off x="0" y="0"/>
+          <a:ext cx="0" cy="0"/>
+          <a:chOff x="0" y="0"/>
+          <a:chExt cx="0" cy="0"/>
+        </a:xfrm>
+      </p:grpSpPr>
+      <p:sp>
+        <p:nvSpPr>
+          <p:cNvPr id="7" name="Title 1"/>
+          <p:cNvSpPr>
+            <a:spLocks noGrp="1"/>
+          </p:cNvSpPr>
+          <p:nvPr>
+            <p:ph type="title"/>
+          </p:nvPr>
+        </p:nvSpPr>
+        <p:spPr>
+          <a:xfrm>
+            <a:off x="0" y="0"/>
+            <a:ext cx="9144000" cy="914400"/>
+          </a:xfrm>
+        </p:spPr>
+        <p:txBody>
+          <a:bodyPr>
+            <a:noAutofit/>
+          </a:bodyPr>
+          <a:lstStyle/>
+          <a:p>
+            <a:r>
+              <a:rPr lang="en-US" sz="2400" b="1" dirty="0" smtClean="0"/>
+              <a:t>Distribution of db4 Regulatory Weights</a:t>
+            </a:r>
+            <a:br>
+              <a:rPr lang="en-US" sz="2400" b="1" dirty="0" smtClean="0"/>
+            </a:br>
+            <a:r>
+              <a:rPr lang="en-US" sz="2400" dirty="0" smtClean="0"/>
+              <a:t>Network: 14 Genes, 35 Edges</a:t>
+            </a:r>
+            <a:endParaRPr lang="en-US" sz="2400" b="1" dirty="0"/>
+          </a:p>
+        </p:txBody>
+      </p:sp>
+      <p:pic>
+        <p:nvPicPr>
+          <p:cNvPr id="4098" name="Picture 2"/>
+          <p:cNvPicPr>
+            <a:picLocks noChangeAspect="1" noChangeArrowheads="1"/>
+          </p:cNvPicPr>
+          <p:nvPr/>
+        </p:nvPicPr>
+        <p:blipFill>
+          <a:blip r:embed="rId2">
+            <a:extLst>
+              <a:ext uri="{28A0092B-C50C-407E-A947-70E740481C1C}">
+                <a14:useLocalDpi xmlns:a14="http://schemas.microsoft.com/office/drawing/2010/main" val="0"/>
+              </a:ext>
+            </a:extLst>
+          </a:blip>
+          <a:srcRect/>
+          <a:stretch>
+            <a:fillRect/>
+          </a:stretch>
+        </p:blipFill>
+        <p:spPr bwMode="auto">
+          <a:xfrm>
+            <a:off x="-69692" y="1345264"/>
+            <a:ext cx="5251292" cy="4607859"/>
+          </a:xfrm>
+          <a:prstGeom prst="rect">
+            <a:avLst/>
+          </a:prstGeom>
+          <a:noFill/>
+          <a:ln>
+            <a:noFill/>
+          </a:ln>
+          <a:extLst>
+            <a:ext uri="{909E8E84-426E-40DD-AFC4-6F175D3DCCD1}">
+              <a14:hiddenFill xmlns:a14="http://schemas.microsoft.com/office/drawing/2010/main">
+                <a:solidFill>
+                  <a:schemeClr val="accent1"/>
+                </a:solidFill>
+              </a14:hiddenFill>
+            </a:ext>
+            <a:ext uri="{91240B29-F687-4F45-9708-019B960494DF}">
+              <a14:hiddenLine xmlns:a14="http://schemas.microsoft.com/office/drawing/2010/main" w="9525">
+                <a:solidFill>
+                  <a:schemeClr val="tx1"/>
+                </a:solidFill>
+                <a:miter lim="800000"/>
+                <a:headEnd/>
+                <a:tailEnd/>
+              </a14:hiddenLine>
+            </a:ext>
+          </a:extLst>
+        </p:spPr>
+      </p:pic>
+      <p:pic>
+        <p:nvPicPr>
+          <p:cNvPr id="4099" name="Picture 3"/>
+          <p:cNvPicPr>
+            <a:picLocks noChangeAspect="1" noChangeArrowheads="1"/>
+          </p:cNvPicPr>
+          <p:nvPr/>
+        </p:nvPicPr>
+        <p:blipFill>
+          <a:blip r:embed="rId3">
+            <a:extLst>
+              <a:ext uri="{28A0092B-C50C-407E-A947-70E740481C1C}">
+                <a14:useLocalDpi xmlns:a14="http://schemas.microsoft.com/office/drawing/2010/main" val="0"/>
+              </a:ext>
+            </a:extLst>
+          </a:blip>
+          <a:srcRect/>
+          <a:stretch>
+            <a:fillRect/>
+          </a:stretch>
+        </p:blipFill>
+        <p:spPr bwMode="auto">
+          <a:xfrm>
+            <a:off x="4092221" y="1295400"/>
+            <a:ext cx="5127979" cy="4754880"/>
+          </a:xfrm>
+          <a:prstGeom prst="rect">
+            <a:avLst/>
+          </a:prstGeom>
+          <a:noFill/>
+          <a:ln>
+            <a:noFill/>
+          </a:ln>
+          <a:extLst>
+            <a:ext uri="{909E8E84-426E-40DD-AFC4-6F175D3DCCD1}">
+              <a14:hiddenFill xmlns:a14="http://schemas.microsoft.com/office/drawing/2010/main">
+                <a:solidFill>
+                  <a:schemeClr val="accent1"/>
+                </a:solidFill>
+              </a14:hiddenFill>
+            </a:ext>
+            <a:ext uri="{91240B29-F687-4F45-9708-019B960494DF}">
+              <a14:hiddenLine xmlns:a14="http://schemas.microsoft.com/office/drawing/2010/main" w="9525">
+                <a:solidFill>
+                  <a:schemeClr val="tx1"/>
+                </a:solidFill>
+                <a:miter lim="800000"/>
+                <a:headEnd/>
+                <a:tailEnd/>
+              </a14:hiddenLine>
+            </a:ext>
+          </a:extLst>
+        </p:spPr>
+      </p:pic>
+    </p:spTree>
+    <p:extLst>
+      <p:ext uri="{BB962C8B-B14F-4D97-AF65-F5344CB8AC3E}">
+        <p14:creationId xmlns:p14="http://schemas.microsoft.com/office/powerpoint/2010/main" val="4088350280"/>
       </p:ext>
     </p:extLst>
   </p:cSld>

</xml_diff>